<commit_message>
spring2024 final push (rip summer)
</commit_message>
<xml_diff>
--- a/classes/fall2023/132/lectures/slides/06-JavaIntro4.pptx
+++ b/classes/fall2023/132/lectures/slides/06-JavaIntro4.pptx
@@ -5,7 +5,7 @@
     <p:sldMasterId id="2147483648" r:id="rId1"/>
   </p:sldMasterIdLst>
   <p:notesMasterIdLst>
-    <p:notesMasterId r:id="rId7"/>
+    <p:notesMasterId r:id="rId9"/>
   </p:notesMasterIdLst>
   <p:sldIdLst>
     <p:sldId id="256" r:id="rId2"/>
@@ -13,6 +13,8 @@
     <p:sldId id="382" r:id="rId4"/>
     <p:sldId id="384" r:id="rId5"/>
     <p:sldId id="383" r:id="rId6"/>
+    <p:sldId id="385" r:id="rId7"/>
+    <p:sldId id="357" r:id="rId8"/>
   </p:sldIdLst>
   <p:sldSz cx="12192000" cy="6858000"/>
   <p:notesSz cx="12192000" cy="6858000"/>
@@ -38,6 +40,114 @@
     </p:ext>
   </p:extLst>
 </p:presentation>
+</file>
+
+<file path=ppt/ink/ink1.xml><?xml version="1.0" encoding="utf-8"?>
+<inkml:ink xmlns:inkml="http://www.w3.org/2003/InkML">
+  <inkml:definitions>
+    <inkml:context xml:id="ctx0">
+      <inkml:inkSource xml:id="inkSrc0">
+        <inkml:traceFormat>
+          <inkml:channel name="X" type="integer" min="-2.14748E9" max="2.14748E9" units="cm"/>
+          <inkml:channel name="Y" type="integer" min="-2.14748E9" max="2.14748E9" units="cm"/>
+          <inkml:channel name="F" type="integer" max="32767" units="dev"/>
+        </inkml:traceFormat>
+        <inkml:channelProperties>
+          <inkml:channelProperty channel="X" name="resolution" value="1000" units="1/cm"/>
+          <inkml:channelProperty channel="Y" name="resolution" value="1000" units="1/cm"/>
+          <inkml:channelProperty channel="F" name="resolution" value="0" units="1/dev"/>
+        </inkml:channelProperties>
+      </inkml:inkSource>
+      <inkml:timestamp xml:id="ts0" timeString="2023-09-08T19:09:39.946"/>
+    </inkml:context>
+    <inkml:brush xml:id="br0">
+      <inkml:brushProperty name="width" value="0.035" units="cm"/>
+      <inkml:brushProperty name="height" value="0.035" units="cm"/>
+    </inkml:brush>
+  </inkml:definitions>
+  <inkml:trace contextRef="#ctx0" brushRef="#br0">609 99 24575,'-84'-15'0,"4"5"0,0-3 0,-131-40 0,209 51 0,-1 1 0,0 0 0,1 0 0,-1 1 0,0-1 0,0 1 0,0-1 0,1 1 0,-1 0 0,0 0 0,0 0 0,0 0 0,-4 1 0,6 0 0,-1 0 0,1 0 0,-1 1 0,1-1 0,0 0 0,-1 1 0,1-1 0,0 0 0,0 1 0,0 0 0,0-1 0,0 1 0,0 0 0,1-1 0,-1 1 0,1 0 0,-1 0 0,1-1 0,-1 1 0,1 0 0,0 3 0,-25 204 0,16-118 0,-1 211 0,3-37 0,-26 12 0,28-191 0,4 0 0,14 126 0,0 45 0,-14 571 0,-11-638 0,0-13 0,11 688 0,3-410 0,-3-450 0,1 1 0,1-1 0,-1 1 0,1-1 0,0 0 0,0 1 0,1-1 0,-1 0 0,1 0 0,0 0 0,1 0 0,-1 0 0,1 0 0,0-1 0,0 1 0,0-1 0,1 0 0,0 0 0,0 0 0,0 0 0,0-1 0,0 1 0,1-1 0,-1 0 0,1-1 0,0 1 0,0-1 0,0 0 0,0 0 0,0 0 0,0-1 0,8 1 0,21 4 0,1-1 0,0-2 0,-1-2 0,43-3 0,-35 0 0,1 3 0,55 6 0,-22 2-1365,-34-6-5461</inkml:trace>
+</inkml:ink>
+</file>
+
+<file path=ppt/ink/ink2.xml><?xml version="1.0" encoding="utf-8"?>
+<inkml:ink xmlns:inkml="http://www.w3.org/2003/InkML">
+  <inkml:definitions>
+    <inkml:context xml:id="ctx0">
+      <inkml:inkSource xml:id="inkSrc0">
+        <inkml:traceFormat>
+          <inkml:channel name="X" type="integer" min="-2.14748E9" max="2.14748E9" units="cm"/>
+          <inkml:channel name="Y" type="integer" min="-2.14748E9" max="2.14748E9" units="cm"/>
+          <inkml:channel name="F" type="integer" max="32767" units="dev"/>
+        </inkml:traceFormat>
+        <inkml:channelProperties>
+          <inkml:channelProperty channel="X" name="resolution" value="1000" units="1/cm"/>
+          <inkml:channelProperty channel="Y" name="resolution" value="1000" units="1/cm"/>
+          <inkml:channelProperty channel="F" name="resolution" value="0" units="1/dev"/>
+        </inkml:channelProperties>
+      </inkml:inkSource>
+      <inkml:timestamp xml:id="ts0" timeString="2023-09-08T19:09:43.361"/>
+    </inkml:context>
+    <inkml:brush xml:id="br0">
+      <inkml:brushProperty name="width" value="0.035" units="cm"/>
+      <inkml:brushProperty name="height" value="0.035" units="cm"/>
+    </inkml:brush>
+  </inkml:definitions>
+  <inkml:trace contextRef="#ctx0" brushRef="#br0">234 2 24575,'153'-2'0,"167"5"0,-316-3 0,0 0 0,0 1 0,-1-1 0,1 1 0,0 0 0,-1 0 0,1 0 0,0 1 0,-1-1 0,0 1 0,1 0 0,-1 0 0,0 0 0,0 0 0,0 1 0,0-1 0,0 1 0,-1 0 0,1-1 0,-1 1 0,0 1 0,0-1 0,0 0 0,0 0 0,0 1 0,-1-1 0,0 1 0,1-1 0,0 6 0,1 10 0,0-1 0,-1 1 0,-1 0 0,-2 33 0,0-28 0,0 140 0,-9 200 0,-9-189 0,-5 110 0,23-231 0,-11 296 0,-1 89 0,-1 14 0,6-2 0,11-257 0,-3 1282 0,0-1469 0,1 8 0,-2-1 0,0 0 0,0 1 0,-5 19 0,5-31 0,0 1 0,0-1 0,0 0 0,-1 0 0,1 0 0,-1 0 0,1 0 0,-1 0 0,0-1 0,0 1 0,0 0 0,-1-1 0,1 0 0,-1 1 0,1-1 0,-1 0 0,0 0 0,0-1 0,0 1 0,0 0 0,0-1 0,0 0 0,0 0 0,-6 2 0,-16-1 0,1 0 0,-1-2 0,0-1 0,0-1 0,1 0 0,-39-11 0,22 5 0,-50-3 0,-176 11-1365,246 0-5461</inkml:trace>
+</inkml:ink>
+</file>
+
+<file path=ppt/ink/ink3.xml><?xml version="1.0" encoding="utf-8"?>
+<inkml:ink xmlns:inkml="http://www.w3.org/2003/InkML">
+  <inkml:definitions>
+    <inkml:context xml:id="ctx0">
+      <inkml:inkSource xml:id="inkSrc0">
+        <inkml:traceFormat>
+          <inkml:channel name="X" type="integer" min="-2.14748E9" max="2.14748E9" units="cm"/>
+          <inkml:channel name="Y" type="integer" min="-2.14748E9" max="2.14748E9" units="cm"/>
+          <inkml:channel name="F" type="integer" max="32767" units="dev"/>
+        </inkml:traceFormat>
+        <inkml:channelProperties>
+          <inkml:channelProperty channel="X" name="resolution" value="1000" units="1/cm"/>
+          <inkml:channelProperty channel="Y" name="resolution" value="1000" units="1/cm"/>
+          <inkml:channelProperty channel="F" name="resolution" value="0" units="1/dev"/>
+        </inkml:channelProperties>
+      </inkml:inkSource>
+      <inkml:timestamp xml:id="ts0" timeString="2023-09-08T19:14:08.897"/>
+    </inkml:context>
+    <inkml:brush xml:id="br0">
+      <inkml:brushProperty name="width" value="0.035" units="cm"/>
+      <inkml:brushProperty name="height" value="0.035" units="cm"/>
+    </inkml:brush>
+  </inkml:definitions>
+  <inkml:trace contextRef="#ctx0" brushRef="#br0">609 99 24575,'-84'-15'0,"4"5"0,0-3 0,-131-40 0,209 51 0,-1 1 0,0 0 0,1 0 0,-1 1 0,0-1 0,0 1 0,0-1 0,1 1 0,-1 0 0,0 0 0,0 0 0,0 0 0,-4 1 0,6 0 0,-1 0 0,1 0 0,-1 1 0,1-1 0,0 0 0,-1 1 0,1-1 0,0 0 0,0 1 0,0 0 0,0-1 0,0 1 0,0 0 0,1-1 0,-1 1 0,1 0 0,-1 0 0,1-1 0,-1 1 0,1 0 0,0 3 0,-25 204 0,16-118 0,-1 211 0,3-37 0,-26 12 0,28-191 0,4 0 0,14 126 0,0 45 0,-14 571 0,-11-638 0,0-13 0,11 688 0,3-410 0,-3-450 0,1 1 0,1-1 0,-1 1 0,1-1 0,0 0 0,0 1 0,1-1 0,-1 0 0,1 0 0,0 0 0,1 0 0,-1 0 0,1 0 0,0-1 0,0 1 0,0-1 0,1 0 0,0 0 0,0 0 0,0 0 0,0-1 0,0 1 0,1-1 0,-1 0 0,1-1 0,0 1 0,0-1 0,0 0 0,0 0 0,0 0 0,0-1 0,8 1 0,21 4 0,1-1 0,0-2 0,-1-2 0,43-3 0,-35 0 0,1 3 0,55 6 0,-22 2-1365,-34-6-5461</inkml:trace>
+</inkml:ink>
+</file>
+
+<file path=ppt/ink/ink4.xml><?xml version="1.0" encoding="utf-8"?>
+<inkml:ink xmlns:inkml="http://www.w3.org/2003/InkML">
+  <inkml:definitions>
+    <inkml:context xml:id="ctx0">
+      <inkml:inkSource xml:id="inkSrc0">
+        <inkml:traceFormat>
+          <inkml:channel name="X" type="integer" min="-2.14748E9" max="2.14748E9" units="cm"/>
+          <inkml:channel name="Y" type="integer" min="-2.14748E9" max="2.14748E9" units="cm"/>
+          <inkml:channel name="F" type="integer" max="32767" units="dev"/>
+        </inkml:traceFormat>
+        <inkml:channelProperties>
+          <inkml:channelProperty channel="X" name="resolution" value="1000" units="1/cm"/>
+          <inkml:channelProperty channel="Y" name="resolution" value="1000" units="1/cm"/>
+          <inkml:channelProperty channel="F" name="resolution" value="0" units="1/dev"/>
+        </inkml:channelProperties>
+      </inkml:inkSource>
+      <inkml:timestamp xml:id="ts0" timeString="2023-09-08T19:14:08.898"/>
+    </inkml:context>
+    <inkml:brush xml:id="br0">
+      <inkml:brushProperty name="width" value="0.035" units="cm"/>
+      <inkml:brushProperty name="height" value="0.035" units="cm"/>
+    </inkml:brush>
+  </inkml:definitions>
+  <inkml:trace contextRef="#ctx0" brushRef="#br0">234 2 24575,'153'-2'0,"167"5"0,-316-3 0,0 0 0,0 1 0,-1-1 0,1 1 0,0 0 0,-1 0 0,1 0 0,0 1 0,-1-1 0,0 1 0,1 0 0,-1 0 0,0 0 0,0 0 0,0 1 0,0-1 0,0 1 0,-1 0 0,1-1 0,-1 1 0,0 1 0,0-1 0,0 0 0,0 0 0,0 1 0,-1-1 0,0 1 0,1-1 0,0 6 0,1 10 0,0-1 0,-1 1 0,-1 0 0,-2 33 0,0-28 0,0 140 0,-9 200 0,-9-189 0,-5 110 0,23-231 0,-11 296 0,-1 89 0,-1 14 0,6-2 0,11-257 0,-3 1282 0,0-1469 0,1 8 0,-2-1 0,0 0 0,0 1 0,-5 19 0,5-31 0,0 1 0,0-1 0,0 0 0,-1 0 0,1 0 0,-1 0 0,1 0 0,-1 0 0,0-1 0,0 1 0,0 0 0,-1-1 0,1 0 0,-1 1 0,1-1 0,-1 0 0,0 0 0,0-1 0,0 1 0,0 0 0,0-1 0,0 0 0,0 0 0,-6 2 0,-16-1 0,1 0 0,-1-2 0,0-1 0,0-1 0,1 0 0,-39-11 0,22 5 0,-50-3 0,-176 11-1365,246 0-5461</inkml:trace>
+</inkml:ink>
 </file>
 
 <file path=ppt/notesMasters/notesMaster1.xml><?xml version="1.0" encoding="utf-8"?>
@@ -122,7 +232,7 @@
           <a:p>
             <a:fld id="{A276F144-9A5A-4C19-9841-AA86F457125C}" type="datetimeFigureOut">
               <a:rPr lang="en-US" smtClean="0"/>
-              <a:t>9/6/2023</a:t>
+              <a:t>1/31/2024</a:t>
             </a:fld>
             <a:endParaRPr lang="en-US"/>
           </a:p>
@@ -534,7 +644,7 @@
           <a:p>
             <a:fld id="{4A264684-B5DE-4471-999D-A89FE7167EDE}" type="datetime1">
               <a:rPr lang="en-US" smtClean="0"/>
-              <a:t>9/6/2023</a:t>
+              <a:t>1/31/2024</a:t>
             </a:fld>
             <a:endParaRPr lang="en-US" dirty="0"/>
           </a:p>
@@ -711,7 +821,7 @@
           <a:p>
             <a:fld id="{AB496B8D-F1C7-4698-A670-934D1C094377}" type="datetime1">
               <a:rPr lang="en-US" smtClean="0"/>
-              <a:t>9/6/2023</a:t>
+              <a:t>1/31/2024</a:t>
             </a:fld>
             <a:endParaRPr lang="en-US"/>
           </a:p>
@@ -925,7 +1035,7 @@
           <a:p>
             <a:fld id="{B9B741FD-8C9F-4A96-83C6-F6C37F5110EC}" type="datetime1">
               <a:rPr lang="en-US" smtClean="0"/>
-              <a:t>9/6/2023</a:t>
+              <a:t>1/31/2024</a:t>
             </a:fld>
             <a:endParaRPr lang="en-US"/>
           </a:p>
@@ -1073,7 +1183,7 @@
           <a:p>
             <a:fld id="{8EAA4857-787A-4808-B2E4-B31FE3774D3A}" type="datetime1">
               <a:rPr lang="en-US" smtClean="0"/>
-              <a:t>9/6/2023</a:t>
+              <a:t>1/31/2024</a:t>
             </a:fld>
             <a:endParaRPr lang="en-US"/>
           </a:p>
@@ -1192,7 +1302,7 @@
           <a:p>
             <a:fld id="{78B8F724-08DC-4554-8E21-4E36C1B4DF66}" type="datetime1">
               <a:rPr lang="en-US" smtClean="0"/>
-              <a:t>9/6/2023</a:t>
+              <a:t>1/31/2024</a:t>
             </a:fld>
             <a:endParaRPr lang="en-US"/>
           </a:p>
@@ -1367,102 +1477,6 @@
       </p:sp>
       <p:sp>
         <p:nvSpPr>
-          <p:cNvPr id="18" name="bg object 18"/>
-          <p:cNvSpPr/>
-          <p:nvPr/>
-        </p:nvSpPr>
-        <p:spPr>
-          <a:xfrm>
-            <a:off x="0" y="0"/>
-            <a:ext cx="826135" cy="875030"/>
-          </a:xfrm>
-          <a:custGeom>
-            <a:avLst/>
-            <a:gdLst/>
-            <a:ahLst/>
-            <a:cxnLst/>
-            <a:rect l="l" t="t" r="r" b="b"/>
-            <a:pathLst>
-              <a:path w="826135" h="875030">
-                <a:moveTo>
-                  <a:pt x="826008" y="0"/>
-                </a:moveTo>
-                <a:lnTo>
-                  <a:pt x="0" y="0"/>
-                </a:lnTo>
-                <a:lnTo>
-                  <a:pt x="0" y="874776"/>
-                </a:lnTo>
-                <a:lnTo>
-                  <a:pt x="826008" y="0"/>
-                </a:lnTo>
-                <a:close/>
-              </a:path>
-            </a:pathLst>
-          </a:custGeom>
-          <a:solidFill>
-            <a:srgbClr val="4471C4"/>
-          </a:solidFill>
-        </p:spPr>
-        <p:txBody>
-          <a:bodyPr wrap="square" lIns="0" tIns="0" rIns="0" bIns="0" rtlCol="0"/>
-          <a:lstStyle/>
-          <a:p>
-            <a:endParaRPr/>
-          </a:p>
-        </p:txBody>
-      </p:sp>
-      <p:sp>
-        <p:nvSpPr>
-          <p:cNvPr id="19" name="bg object 19"/>
-          <p:cNvSpPr/>
-          <p:nvPr/>
-        </p:nvSpPr>
-        <p:spPr>
-          <a:xfrm>
-            <a:off x="0" y="0"/>
-            <a:ext cx="826135" cy="875030"/>
-          </a:xfrm>
-          <a:custGeom>
-            <a:avLst/>
-            <a:gdLst/>
-            <a:ahLst/>
-            <a:cxnLst/>
-            <a:rect l="l" t="t" r="r" b="b"/>
-            <a:pathLst>
-              <a:path w="826135" h="875030">
-                <a:moveTo>
-                  <a:pt x="0" y="0"/>
-                </a:moveTo>
-                <a:lnTo>
-                  <a:pt x="826008" y="0"/>
-                </a:lnTo>
-                <a:lnTo>
-                  <a:pt x="0" y="874776"/>
-                </a:lnTo>
-                <a:lnTo>
-                  <a:pt x="0" y="0"/>
-                </a:lnTo>
-                <a:close/>
-              </a:path>
-            </a:pathLst>
-          </a:custGeom>
-          <a:ln w="12700">
-            <a:solidFill>
-              <a:srgbClr val="2E528F"/>
-            </a:solidFill>
-          </a:ln>
-        </p:spPr>
-        <p:txBody>
-          <a:bodyPr wrap="square" lIns="0" tIns="0" rIns="0" bIns="0" rtlCol="0"/>
-          <a:lstStyle/>
-          <a:p>
-            <a:endParaRPr/>
-          </a:p>
-        </p:txBody>
-      </p:sp>
-      <p:sp>
-        <p:nvSpPr>
           <p:cNvPr id="2" name="Holder 2"/>
           <p:cNvSpPr>
             <a:spLocks noGrp="1"/>
@@ -1615,7 +1629,7 @@
           <a:p>
             <a:fld id="{E8B4CACC-E5C9-450A-9E1E-54F34D7E32FD}" type="datetime1">
               <a:rPr lang="en-US" smtClean="0"/>
-              <a:t>9/6/2023</a:t>
+              <a:t>1/31/2024</a:t>
             </a:fld>
             <a:endParaRPr lang="en-US"/>
           </a:p>
@@ -2203,7 +2217,7 @@
         </p:nvSpPr>
         <p:spPr>
           <a:xfrm>
-            <a:off x="3657600" y="2895600"/>
+            <a:off x="3810000" y="2895600"/>
             <a:ext cx="8153400" cy="382156"/>
           </a:xfrm>
           <a:prstGeom prst="rect">
@@ -2224,41 +2238,6 @@
                 <a:spcPts val="100"/>
               </a:spcBef>
             </a:pPr>
-            <a:r>
-              <a:rPr sz="2400" dirty="0">
-                <a:latin typeface="Calibri"/>
-                <a:cs typeface="Calibri"/>
-              </a:rPr>
-              <a:t>Lecture</a:t>
-            </a:r>
-            <a:r>
-              <a:rPr sz="2400" spc="-25" dirty="0">
-                <a:latin typeface="Calibri"/>
-                <a:cs typeface="Calibri"/>
-              </a:rPr>
-              <a:t> </a:t>
-            </a:r>
-            <a:r>
-              <a:rPr lang="en-US" sz="2400" spc="-25" dirty="0">
-                <a:latin typeface="Calibri"/>
-                <a:cs typeface="Calibri"/>
-              </a:rPr>
-              <a:t>6</a:t>
-            </a:r>
-            <a:r>
-              <a:rPr sz="2400" dirty="0">
-                <a:latin typeface="Calibri"/>
-                <a:cs typeface="Calibri"/>
-              </a:rPr>
-              <a:t>:</a:t>
-            </a:r>
-            <a:r>
-              <a:rPr sz="2400" spc="-55" dirty="0">
-                <a:latin typeface="Calibri"/>
-                <a:cs typeface="Calibri"/>
-              </a:rPr>
-              <a:t> </a:t>
-            </a:r>
             <a:r>
               <a:rPr lang="en-US" sz="2400" dirty="0">
                 <a:latin typeface="Calibri"/>
@@ -2342,7 +2321,7 @@
                 <a:latin typeface="Calibri"/>
                 <a:cs typeface="Calibri"/>
               </a:rPr>
-              <a:t>Fall 2023</a:t>
+              <a:t>Spring 2024</a:t>
             </a:r>
           </a:p>
         </p:txBody>
@@ -2390,15 +2369,9 @@
                 </a:solidFill>
                 <a:latin typeface="Calibri"/>
                 <a:cs typeface="Calibri"/>
-                <a:hlinkClick r:id="rId2">
-                  <a:extLst>
-                    <a:ext uri="{A12FA001-AC4F-418D-AE19-62706E023703}">
-                      <ahyp:hlinkClr xmlns:ahyp="http://schemas.microsoft.com/office/drawing/2018/hyperlinkcolor" val="tx"/>
-                    </a:ext>
-                  </a:extLst>
-                </a:hlinkClick>
-              </a:rPr>
-              <a:t>https://www.cs.montana.edu/pearsall/classes/fall2023/132/main.html</a:t>
+                <a:hlinkClick r:id="rId2"/>
+              </a:rPr>
+              <a:t>https://www.cs.montana.edu/pearsall/classes/spring2024/132/main.html</a:t>
             </a:r>
             <a:endParaRPr lang="en-US" sz="1600" dirty="0">
               <a:solidFill>
@@ -2768,53 +2741,6 @@
       </p:sp>
       <p:sp>
         <p:nvSpPr>
-          <p:cNvPr id="6" name="TextBox 5">
-            <a:extLst>
-              <a:ext uri="{FF2B5EF4-FFF2-40B4-BE49-F238E27FC236}">
-                <a16:creationId xmlns:a16="http://schemas.microsoft.com/office/drawing/2014/main" id="{00C29382-B428-B361-3EB5-0EC3F8BC961D}"/>
-              </a:ext>
-            </a:extLst>
-          </p:cNvPr>
-          <p:cNvSpPr txBox="1"/>
-          <p:nvPr/>
-        </p:nvSpPr>
-        <p:spPr>
-          <a:xfrm>
-            <a:off x="457200" y="1245242"/>
-            <a:ext cx="5232523" cy="461665"/>
-          </a:xfrm>
-          <a:prstGeom prst="rect">
-            <a:avLst/>
-          </a:prstGeom>
-          <a:noFill/>
-        </p:spPr>
-        <p:txBody>
-          <a:bodyPr wrap="none" rtlCol="0">
-            <a:spAutoFit/>
-          </a:bodyPr>
-          <a:lstStyle/>
-          <a:p>
-            <a:pPr marL="285750" indent="-285750">
-              <a:buFont typeface="Arial" panose="020B0604020202020204" pitchFamily="34" charset="0"/>
-              <a:buChar char="•"/>
-            </a:pPr>
-            <a:r>
-              <a:rPr lang="en-US" sz="2400" dirty="0"/>
-              <a:t>Lab 2 due </a:t>
-            </a:r>
-            <a:r>
-              <a:rPr lang="en-US" sz="2400" b="1" dirty="0"/>
-              <a:t>tomorrow</a:t>
-            </a:r>
-            <a:r>
-              <a:rPr lang="en-US" sz="2400" dirty="0"/>
-              <a:t> @ 11:59 PM </a:t>
-            </a:r>
-          </a:p>
-        </p:txBody>
-      </p:sp>
-      <p:sp>
-        <p:nvSpPr>
           <p:cNvPr id="9" name="TextBox 8">
             <a:extLst>
               <a:ext uri="{FF2B5EF4-FFF2-40B4-BE49-F238E27FC236}">
@@ -2827,8 +2753,8 @@
         </p:nvSpPr>
         <p:spPr>
           <a:xfrm>
-            <a:off x="457200" y="2392970"/>
-            <a:ext cx="6532558" cy="1200329"/>
+            <a:off x="533400" y="1680593"/>
+            <a:ext cx="5407249" cy="1200329"/>
           </a:xfrm>
           <a:prstGeom prst="rect">
             <a:avLst/>
@@ -2847,18 +2773,11 @@
             </a:pPr>
             <a:r>
               <a:rPr lang="en-US" sz="2400" dirty="0"/>
-              <a:t>Program 1 is posted, due on September 18</a:t>
-            </a:r>
-            <a:r>
-              <a:rPr lang="en-US" sz="2400" baseline="30000" dirty="0"/>
-              <a:t>th</a:t>
-            </a:r>
-            <a:endParaRPr lang="en-US" sz="2400" baseline="30000" dirty="0">
-              <a:sym typeface="Wingdings" panose="05000000000000000000" pitchFamily="2" charset="2"/>
-            </a:endParaRPr>
-          </a:p>
-          <a:p>
-            <a:pPr marL="285750" lvl="1" indent="-285750">
+              <a:t>Program 1 is posted soon</a:t>
+            </a:r>
+          </a:p>
+          <a:p>
+            <a:pPr marL="285750" indent="-285750">
               <a:buFont typeface="Arial" panose="020B0604020202020204" pitchFamily="34" charset="0"/>
               <a:buChar char="•"/>
             </a:pPr>
@@ -2928,6 +2847,45 @@
           </a:extLst>
         </p:spPr>
       </p:pic>
+      <p:sp>
+        <p:nvSpPr>
+          <p:cNvPr id="7" name="TextBox 6">
+            <a:extLst>
+              <a:ext uri="{FF2B5EF4-FFF2-40B4-BE49-F238E27FC236}">
+                <a16:creationId xmlns:a16="http://schemas.microsoft.com/office/drawing/2014/main" id="{2F4097B2-8A59-550F-31AE-F9A6D29BE51D}"/>
+              </a:ext>
+            </a:extLst>
+          </p:cNvPr>
+          <p:cNvSpPr txBox="1"/>
+          <p:nvPr/>
+        </p:nvSpPr>
+        <p:spPr>
+          <a:xfrm>
+            <a:off x="685800" y="3124200"/>
+            <a:ext cx="4191000" cy="1200329"/>
+          </a:xfrm>
+          <a:prstGeom prst="rect">
+            <a:avLst/>
+          </a:prstGeom>
+          <a:noFill/>
+        </p:spPr>
+        <p:txBody>
+          <a:bodyPr wrap="square" rtlCol="0">
+            <a:spAutoFit/>
+          </a:bodyPr>
+          <a:lstStyle/>
+          <a:p>
+            <a:pPr marL="285750" indent="-285750">
+              <a:buFont typeface="Arial" panose="020B0604020202020204" pitchFamily="34" charset="0"/>
+              <a:buChar char="•"/>
+            </a:pPr>
+            <a:r>
+              <a:rPr lang="en-US" dirty="0"/>
+              <a:t>I do not publicly post solutions, but you can stop by office hours or email me if you want to discuss homework solutions</a:t>
+            </a:r>
+          </a:p>
+        </p:txBody>
+      </p:sp>
     </p:spTree>
     <p:extLst>
       <p:ext uri="{BB962C8B-B14F-4D97-AF65-F5344CB8AC3E}">
@@ -4166,6 +4124,3360 @@
     <p:extLst>
       <p:ext uri="{BB962C8B-B14F-4D97-AF65-F5344CB8AC3E}">
         <p14:creationId xmlns:p14="http://schemas.microsoft.com/office/powerpoint/2010/main" val="3336767821"/>
+      </p:ext>
+    </p:extLst>
+  </p:cSld>
+  <p:clrMapOvr>
+    <a:masterClrMapping/>
+  </p:clrMapOvr>
+</p:sld>
+</file>
+
+<file path=ppt/slides/slide6.xml><?xml version="1.0" encoding="utf-8"?>
+<p:sld xmlns:a="http://schemas.openxmlformats.org/drawingml/2006/main" xmlns:r="http://schemas.openxmlformats.org/officeDocument/2006/relationships" xmlns:p="http://schemas.openxmlformats.org/presentationml/2006/main" showMasterSp="0">
+  <p:cSld>
+    <p:bg>
+      <p:bgPr>
+        <a:noFill/>
+        <a:effectLst/>
+      </p:bgPr>
+    </p:bg>
+    <p:spTree>
+      <p:nvGrpSpPr>
+        <p:cNvPr id="1" name=""/>
+        <p:cNvGrpSpPr/>
+        <p:nvPr/>
+      </p:nvGrpSpPr>
+      <p:grpSpPr>
+        <a:xfrm>
+          <a:off x="0" y="0"/>
+          <a:ext cx="0" cy="0"/>
+          <a:chOff x="0" y="0"/>
+          <a:chExt cx="0" cy="0"/>
+        </a:xfrm>
+      </p:grpSpPr>
+      <p:grpSp>
+        <p:nvGrpSpPr>
+          <p:cNvPr id="3" name="object 3"/>
+          <p:cNvGrpSpPr/>
+          <p:nvPr/>
+        </p:nvGrpSpPr>
+        <p:grpSpPr>
+          <a:xfrm>
+            <a:off x="-6350" y="6466078"/>
+            <a:ext cx="12204700" cy="398780"/>
+            <a:chOff x="-6350" y="6466078"/>
+            <a:chExt cx="12204700" cy="398780"/>
+          </a:xfrm>
+          <a:solidFill>
+            <a:schemeClr val="accent5">
+              <a:lumMod val="60000"/>
+              <a:lumOff val="40000"/>
+            </a:schemeClr>
+          </a:solidFill>
+        </p:grpSpPr>
+        <p:sp>
+          <p:nvSpPr>
+            <p:cNvPr id="4" name="object 4"/>
+            <p:cNvSpPr/>
+            <p:nvPr/>
+          </p:nvSpPr>
+          <p:spPr>
+            <a:xfrm>
+              <a:off x="0" y="6472428"/>
+              <a:ext cx="12192000" cy="386080"/>
+            </a:xfrm>
+            <a:custGeom>
+              <a:avLst/>
+              <a:gdLst/>
+              <a:ahLst/>
+              <a:cxnLst/>
+              <a:rect l="l" t="t" r="r" b="b"/>
+              <a:pathLst>
+                <a:path w="12192000" h="386079">
+                  <a:moveTo>
+                    <a:pt x="12192000" y="0"/>
+                  </a:moveTo>
+                  <a:lnTo>
+                    <a:pt x="0" y="0"/>
+                  </a:lnTo>
+                  <a:lnTo>
+                    <a:pt x="0" y="385572"/>
+                  </a:lnTo>
+                  <a:lnTo>
+                    <a:pt x="12192000" y="385572"/>
+                  </a:lnTo>
+                  <a:lnTo>
+                    <a:pt x="12192000" y="0"/>
+                  </a:lnTo>
+                  <a:close/>
+                </a:path>
+              </a:pathLst>
+            </a:custGeom>
+            <a:grpFill/>
+            <a:ln>
+              <a:solidFill>
+                <a:schemeClr val="accent5">
+                  <a:lumMod val="75000"/>
+                </a:schemeClr>
+              </a:solidFill>
+            </a:ln>
+          </p:spPr>
+          <p:txBody>
+            <a:bodyPr wrap="square" lIns="0" tIns="0" rIns="0" bIns="0" rtlCol="0"/>
+            <a:lstStyle/>
+            <a:p>
+              <a:endParaRPr/>
+            </a:p>
+          </p:txBody>
+        </p:sp>
+        <p:sp>
+          <p:nvSpPr>
+            <p:cNvPr id="5" name="object 5"/>
+            <p:cNvSpPr/>
+            <p:nvPr/>
+          </p:nvSpPr>
+          <p:spPr>
+            <a:xfrm>
+              <a:off x="0" y="6472428"/>
+              <a:ext cx="12192000" cy="386080"/>
+            </a:xfrm>
+            <a:custGeom>
+              <a:avLst/>
+              <a:gdLst/>
+              <a:ahLst/>
+              <a:cxnLst/>
+              <a:rect l="l" t="t" r="r" b="b"/>
+              <a:pathLst>
+                <a:path w="12192000" h="386079">
+                  <a:moveTo>
+                    <a:pt x="0" y="385572"/>
+                  </a:moveTo>
+                  <a:lnTo>
+                    <a:pt x="12192000" y="385572"/>
+                  </a:lnTo>
+                  <a:lnTo>
+                    <a:pt x="12192000" y="0"/>
+                  </a:lnTo>
+                  <a:lnTo>
+                    <a:pt x="0" y="0"/>
+                  </a:lnTo>
+                  <a:lnTo>
+                    <a:pt x="0" y="385572"/>
+                  </a:lnTo>
+                  <a:close/>
+                </a:path>
+              </a:pathLst>
+            </a:custGeom>
+            <a:grpFill/>
+            <a:ln w="12700">
+              <a:solidFill>
+                <a:schemeClr val="accent5">
+                  <a:lumMod val="75000"/>
+                </a:schemeClr>
+              </a:solidFill>
+            </a:ln>
+          </p:spPr>
+          <p:txBody>
+            <a:bodyPr wrap="square" lIns="0" tIns="0" rIns="0" bIns="0" rtlCol="0"/>
+            <a:lstStyle/>
+            <a:p>
+              <a:endParaRPr/>
+            </a:p>
+          </p:txBody>
+        </p:sp>
+      </p:grpSp>
+      <p:pic>
+        <p:nvPicPr>
+          <p:cNvPr id="22" name="Picture 21" descr="Logo&#10;&#10;Description automatically generated with medium confidence">
+            <a:extLst>
+              <a:ext uri="{FF2B5EF4-FFF2-40B4-BE49-F238E27FC236}">
+                <a16:creationId xmlns:a16="http://schemas.microsoft.com/office/drawing/2014/main" id="{56169902-58B3-4978-946A-5780F321F4CD}"/>
+              </a:ext>
+            </a:extLst>
+          </p:cNvPr>
+          <p:cNvPicPr>
+            <a:picLocks noChangeAspect="1"/>
+          </p:cNvPicPr>
+          <p:nvPr/>
+        </p:nvPicPr>
+        <p:blipFill>
+          <a:blip r:embed="rId2" cstate="print">
+            <a:extLst>
+              <a:ext uri="{28A0092B-C50C-407E-A947-70E740481C1C}">
+                <a14:useLocalDpi xmlns:a14="http://schemas.microsoft.com/office/drawing/2010/main" val="0"/>
+              </a:ext>
+            </a:extLst>
+          </a:blip>
+          <a:stretch>
+            <a:fillRect/>
+          </a:stretch>
+        </p:blipFill>
+        <p:spPr>
+          <a:xfrm>
+            <a:off x="10058400" y="6465057"/>
+            <a:ext cx="1468264" cy="369332"/>
+          </a:xfrm>
+          <a:prstGeom prst="rect">
+            <a:avLst/>
+          </a:prstGeom>
+        </p:spPr>
+      </p:pic>
+      <p:sp>
+        <p:nvSpPr>
+          <p:cNvPr id="24" name="Slide Number Placeholder 23">
+            <a:extLst>
+              <a:ext uri="{FF2B5EF4-FFF2-40B4-BE49-F238E27FC236}">
+                <a16:creationId xmlns:a16="http://schemas.microsoft.com/office/drawing/2014/main" id="{C68E4979-F7D8-4A7C-98C3-63A5B4CDDCB7}"/>
+              </a:ext>
+            </a:extLst>
+          </p:cNvPr>
+          <p:cNvSpPr>
+            <a:spLocks noGrp="1"/>
+          </p:cNvSpPr>
+          <p:nvPr>
+            <p:ph type="sldNum" sz="quarter" idx="7"/>
+          </p:nvPr>
+        </p:nvSpPr>
+        <p:spPr/>
+        <p:txBody>
+          <a:bodyPr/>
+          <a:lstStyle/>
+          <a:p>
+            <a:fld id="{B6F15528-21DE-4FAA-801E-634DDDAF4B2B}" type="slidenum">
+              <a:rPr lang="en-US" smtClean="0"/>
+              <a:t>6</a:t>
+            </a:fld>
+            <a:endParaRPr lang="en-US" dirty="0"/>
+          </a:p>
+        </p:txBody>
+      </p:sp>
+      <p:sp>
+        <p:nvSpPr>
+          <p:cNvPr id="7" name="TextBox 6">
+            <a:extLst>
+              <a:ext uri="{FF2B5EF4-FFF2-40B4-BE49-F238E27FC236}">
+                <a16:creationId xmlns:a16="http://schemas.microsoft.com/office/drawing/2014/main" id="{63BF5049-19BD-ACDE-D37B-5FFA4787944A}"/>
+              </a:ext>
+            </a:extLst>
+          </p:cNvPr>
+          <p:cNvSpPr txBox="1"/>
+          <p:nvPr/>
+        </p:nvSpPr>
+        <p:spPr>
+          <a:xfrm>
+            <a:off x="152400" y="76200"/>
+            <a:ext cx="2395207" cy="400110"/>
+          </a:xfrm>
+          <a:prstGeom prst="rect">
+            <a:avLst/>
+          </a:prstGeom>
+          <a:noFill/>
+        </p:spPr>
+        <p:txBody>
+          <a:bodyPr wrap="none" rtlCol="0">
+            <a:spAutoFit/>
+          </a:bodyPr>
+          <a:lstStyle/>
+          <a:p>
+            <a:r>
+              <a:rPr lang="en-US" sz="2000" b="1" dirty="0"/>
+              <a:t>Random Numbers</a:t>
+            </a:r>
+            <a:endParaRPr lang="en-US" sz="2000" dirty="0"/>
+          </a:p>
+        </p:txBody>
+      </p:sp>
+      <p:sp>
+        <p:nvSpPr>
+          <p:cNvPr id="9" name="Rectangle 2">
+            <a:extLst>
+              <a:ext uri="{FF2B5EF4-FFF2-40B4-BE49-F238E27FC236}">
+                <a16:creationId xmlns:a16="http://schemas.microsoft.com/office/drawing/2014/main" id="{19604461-24E6-5579-D845-9884039CD5F7}"/>
+              </a:ext>
+            </a:extLst>
+          </p:cNvPr>
+          <p:cNvSpPr>
+            <a:spLocks noChangeArrowheads="1"/>
+          </p:cNvSpPr>
+          <p:nvPr/>
+        </p:nvSpPr>
+        <p:spPr bwMode="auto">
+          <a:xfrm>
+            <a:off x="1314443" y="712074"/>
+            <a:ext cx="6508192" cy="5524589"/>
+          </a:xfrm>
+          <a:prstGeom prst="rect">
+            <a:avLst/>
+          </a:prstGeom>
+          <a:noFill/>
+          <a:ln>
+            <a:noFill/>
+          </a:ln>
+          <a:effectLst/>
+          <a:extLst>
+            <a:ext uri="{909E8E84-426E-40DD-AFC4-6F175D3DCCD1}">
+              <a14:hiddenFill xmlns:a14="http://schemas.microsoft.com/office/drawing/2010/main">
+                <a:solidFill>
+                  <a:schemeClr val="accent1"/>
+                </a:solidFill>
+              </a14:hiddenFill>
+            </a:ext>
+            <a:ext uri="{91240B29-F687-4F45-9708-019B960494DF}">
+              <a14:hiddenLine xmlns:a14="http://schemas.microsoft.com/office/drawing/2010/main" w="9525">
+                <a:solidFill>
+                  <a:schemeClr val="tx1"/>
+                </a:solidFill>
+                <a:miter lim="800000"/>
+                <a:headEnd/>
+                <a:tailEnd/>
+              </a14:hiddenLine>
+            </a:ext>
+            <a:ext uri="{AF507438-7753-43E0-B8FC-AC1667EBCBE1}">
+              <a14:hiddenEffects xmlns:a14="http://schemas.microsoft.com/office/drawing/2010/main">
+                <a:effectLst>
+                  <a:outerShdw dist="35921" dir="2700000" algn="ctr" rotWithShape="0">
+                    <a:schemeClr val="bg2"/>
+                  </a:outerShdw>
+                </a:effectLst>
+              </a14:hiddenEffects>
+            </a:ext>
+          </a:extLst>
+        </p:spPr>
+        <p:txBody>
+          <a:bodyPr vert="horz" wrap="none" lIns="0" tIns="0" rIns="0" bIns="0" numCol="1" anchor="ctr" anchorCtr="0" compatLnSpc="1">
+            <a:prstTxWarp prst="textNoShape">
+              <a:avLst/>
+            </a:prstTxWarp>
+            <a:spAutoFit/>
+          </a:bodyPr>
+          <a:lstStyle>
+            <a:lvl1pPr algn="l" rtl="0" eaLnBrk="0" fontAlgn="base" hangingPunct="0">
+              <a:spcBef>
+                <a:spcPct val="0"/>
+              </a:spcBef>
+              <a:spcAft>
+                <a:spcPct val="0"/>
+              </a:spcAft>
+              <a:defRPr>
+                <a:solidFill>
+                  <a:schemeClr val="tx1"/>
+                </a:solidFill>
+                <a:latin typeface="Arial" panose="020B0604020202020204" pitchFamily="34" charset="0"/>
+              </a:defRPr>
+            </a:lvl1pPr>
+            <a:lvl2pPr marL="457200" algn="l" rtl="0" eaLnBrk="0" fontAlgn="base" hangingPunct="0">
+              <a:spcBef>
+                <a:spcPct val="0"/>
+              </a:spcBef>
+              <a:spcAft>
+                <a:spcPct val="0"/>
+              </a:spcAft>
+              <a:defRPr>
+                <a:solidFill>
+                  <a:schemeClr val="tx1"/>
+                </a:solidFill>
+                <a:latin typeface="Arial" panose="020B0604020202020204" pitchFamily="34" charset="0"/>
+              </a:defRPr>
+            </a:lvl2pPr>
+            <a:lvl3pPr marL="914400" algn="l" rtl="0" eaLnBrk="0" fontAlgn="base" hangingPunct="0">
+              <a:spcBef>
+                <a:spcPct val="0"/>
+              </a:spcBef>
+              <a:spcAft>
+                <a:spcPct val="0"/>
+              </a:spcAft>
+              <a:defRPr>
+                <a:solidFill>
+                  <a:schemeClr val="tx1"/>
+                </a:solidFill>
+                <a:latin typeface="Arial" panose="020B0604020202020204" pitchFamily="34" charset="0"/>
+              </a:defRPr>
+            </a:lvl3pPr>
+            <a:lvl4pPr marL="1371600" algn="l" rtl="0" eaLnBrk="0" fontAlgn="base" hangingPunct="0">
+              <a:spcBef>
+                <a:spcPct val="0"/>
+              </a:spcBef>
+              <a:spcAft>
+                <a:spcPct val="0"/>
+              </a:spcAft>
+              <a:defRPr>
+                <a:solidFill>
+                  <a:schemeClr val="tx1"/>
+                </a:solidFill>
+                <a:latin typeface="Arial" panose="020B0604020202020204" pitchFamily="34" charset="0"/>
+              </a:defRPr>
+            </a:lvl4pPr>
+            <a:lvl5pPr marL="1828800" algn="l" rtl="0" eaLnBrk="0" fontAlgn="base" hangingPunct="0">
+              <a:spcBef>
+                <a:spcPct val="0"/>
+              </a:spcBef>
+              <a:spcAft>
+                <a:spcPct val="0"/>
+              </a:spcAft>
+              <a:defRPr>
+                <a:solidFill>
+                  <a:schemeClr val="tx1"/>
+                </a:solidFill>
+                <a:latin typeface="Arial" panose="020B0604020202020204" pitchFamily="34" charset="0"/>
+              </a:defRPr>
+            </a:lvl5pPr>
+            <a:lvl6pPr marL="2286000" algn="l" rtl="0" eaLnBrk="0" fontAlgn="base" hangingPunct="0">
+              <a:spcBef>
+                <a:spcPct val="0"/>
+              </a:spcBef>
+              <a:spcAft>
+                <a:spcPct val="0"/>
+              </a:spcAft>
+              <a:defRPr>
+                <a:solidFill>
+                  <a:schemeClr val="tx1"/>
+                </a:solidFill>
+                <a:latin typeface="Arial" panose="020B0604020202020204" pitchFamily="34" charset="0"/>
+              </a:defRPr>
+            </a:lvl6pPr>
+            <a:lvl7pPr marL="2743200" algn="l" rtl="0" eaLnBrk="0" fontAlgn="base" hangingPunct="0">
+              <a:spcBef>
+                <a:spcPct val="0"/>
+              </a:spcBef>
+              <a:spcAft>
+                <a:spcPct val="0"/>
+              </a:spcAft>
+              <a:defRPr>
+                <a:solidFill>
+                  <a:schemeClr val="tx1"/>
+                </a:solidFill>
+                <a:latin typeface="Arial" panose="020B0604020202020204" pitchFamily="34" charset="0"/>
+              </a:defRPr>
+            </a:lvl7pPr>
+            <a:lvl8pPr marL="3200400" algn="l" rtl="0" eaLnBrk="0" fontAlgn="base" hangingPunct="0">
+              <a:spcBef>
+                <a:spcPct val="0"/>
+              </a:spcBef>
+              <a:spcAft>
+                <a:spcPct val="0"/>
+              </a:spcAft>
+              <a:defRPr>
+                <a:solidFill>
+                  <a:schemeClr val="tx1"/>
+                </a:solidFill>
+                <a:latin typeface="Arial" panose="020B0604020202020204" pitchFamily="34" charset="0"/>
+              </a:defRPr>
+            </a:lvl8pPr>
+            <a:lvl9pPr marL="3657600" algn="l" rtl="0" eaLnBrk="0" fontAlgn="base" hangingPunct="0">
+              <a:spcBef>
+                <a:spcPct val="0"/>
+              </a:spcBef>
+              <a:spcAft>
+                <a:spcPct val="0"/>
+              </a:spcAft>
+              <a:defRPr>
+                <a:solidFill>
+                  <a:schemeClr val="tx1"/>
+                </a:solidFill>
+                <a:latin typeface="Arial" panose="020B0604020202020204" pitchFamily="34" charset="0"/>
+              </a:defRPr>
+            </a:lvl9pPr>
+          </a:lstStyle>
+          <a:p>
+            <a:pPr marL="0" marR="0" lvl="0" indent="0" algn="l" defTabSz="914400" rtl="0" eaLnBrk="0" fontAlgn="base" latinLnBrk="0" hangingPunct="0">
+              <a:lnSpc>
+                <a:spcPct val="100000"/>
+              </a:lnSpc>
+              <a:spcBef>
+                <a:spcPct val="0"/>
+              </a:spcBef>
+              <a:spcAft>
+                <a:spcPct val="0"/>
+              </a:spcAft>
+              <a:buClrTx/>
+              <a:buSzTx/>
+              <a:buFontTx/>
+              <a:buNone/>
+              <a:tabLst/>
+            </a:pPr>
+            <a:r>
+              <a:rPr kumimoji="0" lang="en-US" altLang="en-US" sz="1600" b="0" i="0" u="none" strike="noStrike" cap="none" normalizeH="0" baseline="0" dirty="0">
+                <a:ln>
+                  <a:noFill/>
+                </a:ln>
+                <a:solidFill>
+                  <a:srgbClr val="273239"/>
+                </a:solidFill>
+                <a:effectLst/>
+                <a:latin typeface="Consolas" panose="020B0609020204030204" pitchFamily="49" charset="0"/>
+              </a:rPr>
+              <a:t> </a:t>
+            </a:r>
+          </a:p>
+          <a:p>
+            <a:pPr marL="0" marR="0" lvl="0" indent="0" algn="l" defTabSz="914400" rtl="0" eaLnBrk="0" fontAlgn="base" latinLnBrk="0" hangingPunct="0">
+              <a:lnSpc>
+                <a:spcPct val="100000"/>
+              </a:lnSpc>
+              <a:spcBef>
+                <a:spcPct val="0"/>
+              </a:spcBef>
+              <a:spcAft>
+                <a:spcPct val="0"/>
+              </a:spcAft>
+              <a:buClrTx/>
+              <a:buSzTx/>
+              <a:buFontTx/>
+              <a:buNone/>
+              <a:tabLst/>
+            </a:pPr>
+            <a:endParaRPr lang="en-US" altLang="en-US" sz="1600" dirty="0">
+              <a:solidFill>
+                <a:srgbClr val="273239"/>
+              </a:solidFill>
+              <a:latin typeface="Consolas" panose="020B0609020204030204" pitchFamily="49" charset="0"/>
+            </a:endParaRPr>
+          </a:p>
+          <a:p>
+            <a:pPr marL="0" marR="0" lvl="0" indent="0" algn="l" defTabSz="914400" rtl="0" eaLnBrk="0" fontAlgn="base" latinLnBrk="0" hangingPunct="0">
+              <a:lnSpc>
+                <a:spcPct val="100000"/>
+              </a:lnSpc>
+              <a:spcBef>
+                <a:spcPct val="0"/>
+              </a:spcBef>
+              <a:spcAft>
+                <a:spcPct val="0"/>
+              </a:spcAft>
+              <a:buClrTx/>
+              <a:buSzTx/>
+              <a:buFontTx/>
+              <a:buNone/>
+              <a:tabLst/>
+            </a:pPr>
+            <a:r>
+              <a:rPr kumimoji="0" lang="en-US" altLang="en-US" sz="1600" b="1" i="0" u="none" strike="noStrike" cap="none" normalizeH="0" baseline="0" dirty="0">
+                <a:ln>
+                  <a:noFill/>
+                </a:ln>
+                <a:solidFill>
+                  <a:srgbClr val="006699"/>
+                </a:solidFill>
+                <a:effectLst/>
+                <a:latin typeface="Consolas" panose="020B0609020204030204" pitchFamily="49" charset="0"/>
+              </a:rPr>
+              <a:t>public</a:t>
+            </a:r>
+            <a:r>
+              <a:rPr kumimoji="0" lang="en-US" altLang="en-US" sz="700" b="0" i="0" u="none" strike="noStrike" cap="none" normalizeH="0" baseline="0" dirty="0">
+                <a:ln>
+                  <a:noFill/>
+                </a:ln>
+                <a:solidFill>
+                  <a:srgbClr val="273239"/>
+                </a:solidFill>
+                <a:effectLst/>
+                <a:latin typeface="Consolas" panose="020B0609020204030204" pitchFamily="49" charset="0"/>
+              </a:rPr>
+              <a:t> </a:t>
+            </a:r>
+            <a:r>
+              <a:rPr kumimoji="0" lang="en-US" altLang="en-US" sz="1600" b="1" i="0" u="none" strike="noStrike" cap="none" normalizeH="0" baseline="0" dirty="0">
+                <a:ln>
+                  <a:noFill/>
+                </a:ln>
+                <a:solidFill>
+                  <a:srgbClr val="006699"/>
+                </a:solidFill>
+                <a:effectLst/>
+                <a:latin typeface="Consolas" panose="020B0609020204030204" pitchFamily="49" charset="0"/>
+              </a:rPr>
+              <a:t>static</a:t>
+            </a:r>
+            <a:r>
+              <a:rPr kumimoji="0" lang="en-US" altLang="en-US" sz="700" b="0" i="0" u="none" strike="noStrike" cap="none" normalizeH="0" baseline="0" dirty="0">
+                <a:ln>
+                  <a:noFill/>
+                </a:ln>
+                <a:solidFill>
+                  <a:srgbClr val="273239"/>
+                </a:solidFill>
+                <a:effectLst/>
+                <a:latin typeface="Consolas" panose="020B0609020204030204" pitchFamily="49" charset="0"/>
+              </a:rPr>
+              <a:t> </a:t>
+            </a:r>
+            <a:r>
+              <a:rPr kumimoji="0" lang="en-US" altLang="en-US" sz="1600" b="1" i="0" u="none" strike="noStrike" cap="none" normalizeH="0" baseline="0" dirty="0">
+                <a:ln>
+                  <a:noFill/>
+                </a:ln>
+                <a:solidFill>
+                  <a:srgbClr val="006699"/>
+                </a:solidFill>
+                <a:effectLst/>
+                <a:latin typeface="Consolas" panose="020B0609020204030204" pitchFamily="49" charset="0"/>
+              </a:rPr>
+              <a:t>void</a:t>
+            </a:r>
+            <a:r>
+              <a:rPr kumimoji="0" lang="en-US" altLang="en-US" sz="700" b="0" i="0" u="none" strike="noStrike" cap="none" normalizeH="0" baseline="0" dirty="0">
+                <a:ln>
+                  <a:noFill/>
+                </a:ln>
+                <a:solidFill>
+                  <a:srgbClr val="273239"/>
+                </a:solidFill>
+                <a:effectLst/>
+                <a:latin typeface="Consolas" panose="020B0609020204030204" pitchFamily="49" charset="0"/>
+              </a:rPr>
+              <a:t> </a:t>
+            </a:r>
+            <a:r>
+              <a:rPr kumimoji="0" lang="en-US" altLang="en-US" sz="1600" b="0" i="0" u="none" strike="noStrike" cap="none" normalizeH="0" baseline="0" dirty="0">
+                <a:ln>
+                  <a:noFill/>
+                </a:ln>
+                <a:solidFill>
+                  <a:srgbClr val="000000"/>
+                </a:solidFill>
+                <a:effectLst/>
+                <a:latin typeface="Consolas" panose="020B0609020204030204" pitchFamily="49" charset="0"/>
+              </a:rPr>
+              <a:t>main(String </a:t>
+            </a:r>
+            <a:r>
+              <a:rPr kumimoji="0" lang="en-US" altLang="en-US" sz="1600" b="0" i="0" u="none" strike="noStrike" cap="none" normalizeH="0" baseline="0" dirty="0" err="1">
+                <a:ln>
+                  <a:noFill/>
+                </a:ln>
+                <a:solidFill>
+                  <a:srgbClr val="000000"/>
+                </a:solidFill>
+                <a:effectLst/>
+                <a:latin typeface="Consolas" panose="020B0609020204030204" pitchFamily="49" charset="0"/>
+              </a:rPr>
+              <a:t>args</a:t>
+            </a:r>
+            <a:r>
+              <a:rPr kumimoji="0" lang="en-US" altLang="en-US" sz="1600" b="0" i="0" u="none" strike="noStrike" cap="none" normalizeH="0" baseline="0" dirty="0">
+                <a:ln>
+                  <a:noFill/>
+                </a:ln>
+                <a:solidFill>
+                  <a:srgbClr val="000000"/>
+                </a:solidFill>
+                <a:effectLst/>
+                <a:latin typeface="Consolas" panose="020B0609020204030204" pitchFamily="49" charset="0"/>
+              </a:rPr>
+              <a:t>[])</a:t>
+            </a:r>
+            <a:r>
+              <a:rPr lang="en-US" altLang="en-US" sz="700" dirty="0"/>
+              <a:t> </a:t>
+            </a:r>
+            <a:r>
+              <a:rPr kumimoji="0" lang="en-US" altLang="en-US" sz="1600" b="0" i="0" u="none" strike="noStrike" cap="none" normalizeH="0" baseline="0" dirty="0">
+                <a:ln>
+                  <a:noFill/>
+                </a:ln>
+                <a:solidFill>
+                  <a:srgbClr val="000000"/>
+                </a:solidFill>
+                <a:effectLst/>
+                <a:latin typeface="Consolas" panose="020B0609020204030204" pitchFamily="49" charset="0"/>
+              </a:rPr>
+              <a:t>{</a:t>
+            </a:r>
+          </a:p>
+          <a:p>
+            <a:pPr marL="0" marR="0" lvl="0" indent="0" algn="l" defTabSz="914400" rtl="0" eaLnBrk="0" fontAlgn="base" latinLnBrk="0" hangingPunct="0">
+              <a:lnSpc>
+                <a:spcPct val="100000"/>
+              </a:lnSpc>
+              <a:spcBef>
+                <a:spcPct val="0"/>
+              </a:spcBef>
+              <a:spcAft>
+                <a:spcPct val="0"/>
+              </a:spcAft>
+              <a:buClrTx/>
+              <a:buSzTx/>
+              <a:buFontTx/>
+              <a:buNone/>
+              <a:tabLst/>
+            </a:pPr>
+            <a:endParaRPr kumimoji="0" lang="en-US" altLang="en-US" sz="700" b="0" i="0" u="none" strike="noStrike" cap="none" normalizeH="0" baseline="0" dirty="0">
+              <a:ln>
+                <a:noFill/>
+              </a:ln>
+              <a:solidFill>
+                <a:schemeClr val="tx1"/>
+              </a:solidFill>
+              <a:effectLst/>
+            </a:endParaRPr>
+          </a:p>
+          <a:p>
+            <a:pPr marL="0" marR="0" lvl="0" indent="0" algn="l" defTabSz="914400" rtl="0" eaLnBrk="0" fontAlgn="base" latinLnBrk="0" hangingPunct="0">
+              <a:lnSpc>
+                <a:spcPct val="100000"/>
+              </a:lnSpc>
+              <a:spcBef>
+                <a:spcPct val="0"/>
+              </a:spcBef>
+              <a:spcAft>
+                <a:spcPct val="0"/>
+              </a:spcAft>
+              <a:buClrTx/>
+              <a:buSzTx/>
+              <a:buFontTx/>
+              <a:buNone/>
+              <a:tabLst/>
+            </a:pPr>
+            <a:r>
+              <a:rPr kumimoji="0" lang="en-US" altLang="en-US" sz="1600" b="0" i="0" u="none" strike="noStrike" cap="none" normalizeH="0" baseline="0" dirty="0">
+                <a:ln>
+                  <a:noFill/>
+                </a:ln>
+                <a:solidFill>
+                  <a:srgbClr val="273239"/>
+                </a:solidFill>
+                <a:effectLst/>
+                <a:latin typeface="Consolas" panose="020B0609020204030204" pitchFamily="49" charset="0"/>
+              </a:rPr>
+              <a:t>        </a:t>
+            </a:r>
+            <a:r>
+              <a:rPr kumimoji="0" lang="en-US" altLang="en-US" sz="1600" b="0" i="0" u="none" strike="noStrike" cap="none" normalizeH="0" baseline="0" dirty="0">
+                <a:ln>
+                  <a:noFill/>
+                </a:ln>
+                <a:solidFill>
+                  <a:srgbClr val="008200"/>
+                </a:solidFill>
+                <a:effectLst/>
+                <a:latin typeface="Consolas" panose="020B0609020204030204" pitchFamily="49" charset="0"/>
+              </a:rPr>
+              <a:t>// create instance of Random class</a:t>
+            </a:r>
+            <a:endParaRPr kumimoji="0" lang="en-US" altLang="en-US" sz="700" b="0" i="0" u="none" strike="noStrike" cap="none" normalizeH="0" baseline="0" dirty="0">
+              <a:ln>
+                <a:noFill/>
+              </a:ln>
+              <a:solidFill>
+                <a:schemeClr val="tx1"/>
+              </a:solidFill>
+              <a:effectLst/>
+            </a:endParaRPr>
+          </a:p>
+          <a:p>
+            <a:pPr marL="0" marR="0" lvl="0" indent="0" algn="l" defTabSz="914400" rtl="0" eaLnBrk="0" fontAlgn="base" latinLnBrk="0" hangingPunct="0">
+              <a:lnSpc>
+                <a:spcPct val="100000"/>
+              </a:lnSpc>
+              <a:spcBef>
+                <a:spcPct val="0"/>
+              </a:spcBef>
+              <a:spcAft>
+                <a:spcPct val="0"/>
+              </a:spcAft>
+              <a:buClrTx/>
+              <a:buSzTx/>
+              <a:buFontTx/>
+              <a:buNone/>
+              <a:tabLst/>
+            </a:pPr>
+            <a:r>
+              <a:rPr kumimoji="0" lang="en-US" altLang="en-US" sz="1600" b="0" i="0" u="none" strike="noStrike" cap="none" normalizeH="0" baseline="0" dirty="0">
+                <a:ln>
+                  <a:noFill/>
+                </a:ln>
+                <a:solidFill>
+                  <a:srgbClr val="273239"/>
+                </a:solidFill>
+                <a:effectLst/>
+                <a:latin typeface="Consolas" panose="020B0609020204030204" pitchFamily="49" charset="0"/>
+              </a:rPr>
+              <a:t>        </a:t>
+            </a:r>
+            <a:r>
+              <a:rPr kumimoji="0" lang="en-US" altLang="en-US" sz="1600" b="0" i="0" u="none" strike="noStrike" cap="none" normalizeH="0" baseline="0" dirty="0">
+                <a:ln>
+                  <a:noFill/>
+                </a:ln>
+                <a:solidFill>
+                  <a:srgbClr val="000000"/>
+                </a:solidFill>
+                <a:effectLst/>
+                <a:latin typeface="Consolas" panose="020B0609020204030204" pitchFamily="49" charset="0"/>
+              </a:rPr>
+              <a:t>Random rand = </a:t>
+            </a:r>
+            <a:r>
+              <a:rPr kumimoji="0" lang="en-US" altLang="en-US" sz="1600" b="1" i="0" u="none" strike="noStrike" cap="none" normalizeH="0" baseline="0" dirty="0">
+                <a:ln>
+                  <a:noFill/>
+                </a:ln>
+                <a:solidFill>
+                  <a:srgbClr val="006699"/>
+                </a:solidFill>
+                <a:effectLst/>
+                <a:latin typeface="Consolas" panose="020B0609020204030204" pitchFamily="49" charset="0"/>
+              </a:rPr>
+              <a:t>new</a:t>
+            </a:r>
+            <a:r>
+              <a:rPr kumimoji="0" lang="en-US" altLang="en-US" sz="700" b="0" i="0" u="none" strike="noStrike" cap="none" normalizeH="0" baseline="0" dirty="0">
+                <a:ln>
+                  <a:noFill/>
+                </a:ln>
+                <a:solidFill>
+                  <a:srgbClr val="273239"/>
+                </a:solidFill>
+                <a:effectLst/>
+                <a:latin typeface="Consolas" panose="020B0609020204030204" pitchFamily="49" charset="0"/>
+              </a:rPr>
+              <a:t> </a:t>
+            </a:r>
+            <a:r>
+              <a:rPr kumimoji="0" lang="en-US" altLang="en-US" sz="1600" b="0" i="0" u="none" strike="noStrike" cap="none" normalizeH="0" baseline="0" dirty="0">
+                <a:ln>
+                  <a:noFill/>
+                </a:ln>
+                <a:solidFill>
+                  <a:srgbClr val="000000"/>
+                </a:solidFill>
+                <a:effectLst/>
+                <a:latin typeface="Consolas" panose="020B0609020204030204" pitchFamily="49" charset="0"/>
+              </a:rPr>
+              <a:t>Random();</a:t>
+            </a:r>
+            <a:endParaRPr kumimoji="0" lang="en-US" altLang="en-US" sz="700" b="0" i="0" u="none" strike="noStrike" cap="none" normalizeH="0" baseline="0" dirty="0">
+              <a:ln>
+                <a:noFill/>
+              </a:ln>
+              <a:solidFill>
+                <a:schemeClr val="tx1"/>
+              </a:solidFill>
+              <a:effectLst/>
+            </a:endParaRPr>
+          </a:p>
+          <a:p>
+            <a:pPr marL="0" marR="0" lvl="0" indent="0" algn="l" defTabSz="914400" rtl="0" eaLnBrk="0" fontAlgn="base" latinLnBrk="0" hangingPunct="0">
+              <a:lnSpc>
+                <a:spcPct val="100000"/>
+              </a:lnSpc>
+              <a:spcBef>
+                <a:spcPct val="0"/>
+              </a:spcBef>
+              <a:spcAft>
+                <a:spcPct val="0"/>
+              </a:spcAft>
+              <a:buClrTx/>
+              <a:buSzTx/>
+              <a:buFontTx/>
+              <a:buNone/>
+              <a:tabLst/>
+            </a:pPr>
+            <a:r>
+              <a:rPr kumimoji="0" lang="en-US" altLang="en-US" sz="1600" b="0" i="0" u="none" strike="noStrike" cap="none" normalizeH="0" baseline="0" dirty="0">
+                <a:ln>
+                  <a:noFill/>
+                </a:ln>
+                <a:solidFill>
+                  <a:srgbClr val="273239"/>
+                </a:solidFill>
+                <a:effectLst/>
+                <a:latin typeface="Consolas" panose="020B0609020204030204" pitchFamily="49" charset="0"/>
+              </a:rPr>
+              <a:t>  </a:t>
+            </a:r>
+            <a:r>
+              <a:rPr kumimoji="0" lang="en-US" altLang="en-US" sz="700" b="0" i="0" u="none" strike="noStrike" cap="none" normalizeH="0" baseline="0" dirty="0">
+                <a:ln>
+                  <a:noFill/>
+                </a:ln>
+                <a:solidFill>
+                  <a:srgbClr val="273239"/>
+                </a:solidFill>
+                <a:effectLst/>
+                <a:latin typeface="Consolas" panose="020B0609020204030204" pitchFamily="49" charset="0"/>
+              </a:rPr>
+              <a:t> </a:t>
+            </a:r>
+            <a:endParaRPr kumimoji="0" lang="en-US" altLang="en-US" sz="2800" b="0" i="0" u="none" strike="noStrike" cap="none" normalizeH="0" baseline="0" dirty="0">
+              <a:ln>
+                <a:noFill/>
+              </a:ln>
+              <a:solidFill>
+                <a:schemeClr val="tx1"/>
+              </a:solidFill>
+              <a:effectLst/>
+            </a:endParaRPr>
+          </a:p>
+          <a:p>
+            <a:pPr marL="0" marR="0" lvl="0" indent="0" algn="l" defTabSz="914400" rtl="0" eaLnBrk="0" fontAlgn="base" latinLnBrk="0" hangingPunct="0">
+              <a:lnSpc>
+                <a:spcPct val="100000"/>
+              </a:lnSpc>
+              <a:spcBef>
+                <a:spcPct val="0"/>
+              </a:spcBef>
+              <a:spcAft>
+                <a:spcPct val="0"/>
+              </a:spcAft>
+              <a:buClrTx/>
+              <a:buSzTx/>
+              <a:buFontTx/>
+              <a:buNone/>
+              <a:tabLst/>
+            </a:pPr>
+            <a:r>
+              <a:rPr kumimoji="0" lang="en-US" altLang="en-US" sz="1600" b="0" i="0" u="none" strike="noStrike" cap="none" normalizeH="0" baseline="0" dirty="0">
+                <a:ln>
+                  <a:noFill/>
+                </a:ln>
+                <a:solidFill>
+                  <a:srgbClr val="273239"/>
+                </a:solidFill>
+                <a:effectLst/>
+                <a:latin typeface="Consolas" panose="020B0609020204030204" pitchFamily="49" charset="0"/>
+              </a:rPr>
+              <a:t>        </a:t>
+            </a:r>
+            <a:r>
+              <a:rPr kumimoji="0" lang="en-US" altLang="en-US" sz="1600" b="0" i="0" u="none" strike="noStrike" cap="none" normalizeH="0" baseline="0" dirty="0">
+                <a:ln>
+                  <a:noFill/>
+                </a:ln>
+                <a:solidFill>
+                  <a:srgbClr val="008200"/>
+                </a:solidFill>
+                <a:effectLst/>
+                <a:latin typeface="Consolas" panose="020B0609020204030204" pitchFamily="49" charset="0"/>
+              </a:rPr>
+              <a:t>// Generate random integers in range 0 to 999</a:t>
+            </a:r>
+            <a:endParaRPr kumimoji="0" lang="en-US" altLang="en-US" sz="700" b="0" i="0" u="none" strike="noStrike" cap="none" normalizeH="0" baseline="0" dirty="0">
+              <a:ln>
+                <a:noFill/>
+              </a:ln>
+              <a:solidFill>
+                <a:schemeClr val="tx1"/>
+              </a:solidFill>
+              <a:effectLst/>
+            </a:endParaRPr>
+          </a:p>
+          <a:p>
+            <a:pPr marL="0" marR="0" lvl="0" indent="0" algn="l" defTabSz="914400" rtl="0" eaLnBrk="0" fontAlgn="base" latinLnBrk="0" hangingPunct="0">
+              <a:lnSpc>
+                <a:spcPct val="100000"/>
+              </a:lnSpc>
+              <a:spcBef>
+                <a:spcPct val="0"/>
+              </a:spcBef>
+              <a:spcAft>
+                <a:spcPct val="0"/>
+              </a:spcAft>
+              <a:buClrTx/>
+              <a:buSzTx/>
+              <a:buFontTx/>
+              <a:buNone/>
+              <a:tabLst/>
+            </a:pPr>
+            <a:r>
+              <a:rPr kumimoji="0" lang="en-US" altLang="en-US" sz="1600" b="0" i="0" u="none" strike="noStrike" cap="none" normalizeH="0" baseline="0" dirty="0">
+                <a:ln>
+                  <a:noFill/>
+                </a:ln>
+                <a:solidFill>
+                  <a:srgbClr val="273239"/>
+                </a:solidFill>
+                <a:effectLst/>
+                <a:latin typeface="Consolas" panose="020B0609020204030204" pitchFamily="49" charset="0"/>
+              </a:rPr>
+              <a:t>        </a:t>
+            </a:r>
+            <a:r>
+              <a:rPr kumimoji="0" lang="en-US" altLang="en-US" sz="1600" b="1" i="0" u="none" strike="noStrike" cap="none" normalizeH="0" baseline="0" dirty="0">
+                <a:ln>
+                  <a:noFill/>
+                </a:ln>
+                <a:solidFill>
+                  <a:srgbClr val="006699"/>
+                </a:solidFill>
+                <a:effectLst/>
+                <a:latin typeface="Consolas" panose="020B0609020204030204" pitchFamily="49" charset="0"/>
+              </a:rPr>
+              <a:t>int</a:t>
+            </a:r>
+            <a:r>
+              <a:rPr kumimoji="0" lang="en-US" altLang="en-US" sz="700" b="0" i="0" u="none" strike="noStrike" cap="none" normalizeH="0" baseline="0" dirty="0">
+                <a:ln>
+                  <a:noFill/>
+                </a:ln>
+                <a:solidFill>
+                  <a:srgbClr val="273239"/>
+                </a:solidFill>
+                <a:effectLst/>
+                <a:latin typeface="Consolas" panose="020B0609020204030204" pitchFamily="49" charset="0"/>
+              </a:rPr>
+              <a:t> </a:t>
+            </a:r>
+            <a:r>
+              <a:rPr kumimoji="0" lang="en-US" altLang="en-US" sz="1600" b="0" i="0" u="none" strike="noStrike" cap="none" normalizeH="0" baseline="0" dirty="0">
+                <a:ln>
+                  <a:noFill/>
+                </a:ln>
+                <a:solidFill>
+                  <a:srgbClr val="000000"/>
+                </a:solidFill>
+                <a:effectLst/>
+                <a:latin typeface="Consolas" panose="020B0609020204030204" pitchFamily="49" charset="0"/>
+              </a:rPr>
+              <a:t>rand_int1 = </a:t>
+            </a:r>
+            <a:r>
+              <a:rPr kumimoji="0" lang="en-US" altLang="en-US" sz="1600" b="0" i="0" u="none" strike="noStrike" cap="none" normalizeH="0" baseline="0" dirty="0" err="1">
+                <a:ln>
+                  <a:noFill/>
+                </a:ln>
+                <a:solidFill>
+                  <a:srgbClr val="000000"/>
+                </a:solidFill>
+                <a:effectLst/>
+                <a:latin typeface="Consolas" panose="020B0609020204030204" pitchFamily="49" charset="0"/>
+              </a:rPr>
+              <a:t>rand.nextInt</a:t>
+            </a:r>
+            <a:r>
+              <a:rPr kumimoji="0" lang="en-US" altLang="en-US" sz="1600" b="0" i="0" u="none" strike="noStrike" cap="none" normalizeH="0" baseline="0" dirty="0">
+                <a:ln>
+                  <a:noFill/>
+                </a:ln>
+                <a:solidFill>
+                  <a:srgbClr val="000000"/>
+                </a:solidFill>
+                <a:effectLst/>
+                <a:latin typeface="Consolas" panose="020B0609020204030204" pitchFamily="49" charset="0"/>
+              </a:rPr>
+              <a:t>(</a:t>
+            </a:r>
+            <a:r>
+              <a:rPr kumimoji="0" lang="en-US" altLang="en-US" sz="1600" b="0" i="0" u="none" strike="noStrike" cap="none" normalizeH="0" baseline="0" dirty="0">
+                <a:ln>
+                  <a:noFill/>
+                </a:ln>
+                <a:solidFill>
+                  <a:srgbClr val="009900"/>
+                </a:solidFill>
+                <a:effectLst/>
+                <a:latin typeface="Consolas" panose="020B0609020204030204" pitchFamily="49" charset="0"/>
+              </a:rPr>
+              <a:t>1000</a:t>
+            </a:r>
+            <a:r>
+              <a:rPr kumimoji="0" lang="en-US" altLang="en-US" sz="1600" b="0" i="0" u="none" strike="noStrike" cap="none" normalizeH="0" baseline="0" dirty="0">
+                <a:ln>
+                  <a:noFill/>
+                </a:ln>
+                <a:solidFill>
+                  <a:srgbClr val="000000"/>
+                </a:solidFill>
+                <a:effectLst/>
+                <a:latin typeface="Consolas" panose="020B0609020204030204" pitchFamily="49" charset="0"/>
+              </a:rPr>
+              <a:t>);</a:t>
+            </a:r>
+            <a:endParaRPr kumimoji="0" lang="en-US" altLang="en-US" sz="700" b="0" i="0" u="none" strike="noStrike" cap="none" normalizeH="0" baseline="0" dirty="0">
+              <a:ln>
+                <a:noFill/>
+              </a:ln>
+              <a:solidFill>
+                <a:schemeClr val="tx1"/>
+              </a:solidFill>
+              <a:effectLst/>
+            </a:endParaRPr>
+          </a:p>
+          <a:p>
+            <a:pPr marL="0" marR="0" lvl="0" indent="0" algn="l" defTabSz="914400" rtl="0" eaLnBrk="0" fontAlgn="base" latinLnBrk="0" hangingPunct="0">
+              <a:lnSpc>
+                <a:spcPct val="100000"/>
+              </a:lnSpc>
+              <a:spcBef>
+                <a:spcPct val="0"/>
+              </a:spcBef>
+              <a:spcAft>
+                <a:spcPct val="0"/>
+              </a:spcAft>
+              <a:buClrTx/>
+              <a:buSzTx/>
+              <a:buFontTx/>
+              <a:buNone/>
+              <a:tabLst/>
+            </a:pPr>
+            <a:r>
+              <a:rPr kumimoji="0" lang="en-US" altLang="en-US" sz="1600" b="0" i="0" u="none" strike="noStrike" cap="none" normalizeH="0" baseline="0" dirty="0">
+                <a:ln>
+                  <a:noFill/>
+                </a:ln>
+                <a:solidFill>
+                  <a:srgbClr val="273239"/>
+                </a:solidFill>
+                <a:effectLst/>
+                <a:latin typeface="Consolas" panose="020B0609020204030204" pitchFamily="49" charset="0"/>
+              </a:rPr>
+              <a:t>        </a:t>
+            </a:r>
+            <a:r>
+              <a:rPr kumimoji="0" lang="en-US" altLang="en-US" sz="1600" b="1" i="0" u="none" strike="noStrike" cap="none" normalizeH="0" baseline="0" dirty="0">
+                <a:ln>
+                  <a:noFill/>
+                </a:ln>
+                <a:solidFill>
+                  <a:srgbClr val="006699"/>
+                </a:solidFill>
+                <a:effectLst/>
+                <a:latin typeface="Consolas" panose="020B0609020204030204" pitchFamily="49" charset="0"/>
+              </a:rPr>
+              <a:t>int</a:t>
+            </a:r>
+            <a:r>
+              <a:rPr kumimoji="0" lang="en-US" altLang="en-US" sz="700" b="0" i="0" u="none" strike="noStrike" cap="none" normalizeH="0" baseline="0" dirty="0">
+                <a:ln>
+                  <a:noFill/>
+                </a:ln>
+                <a:solidFill>
+                  <a:srgbClr val="273239"/>
+                </a:solidFill>
+                <a:effectLst/>
+                <a:latin typeface="Consolas" panose="020B0609020204030204" pitchFamily="49" charset="0"/>
+              </a:rPr>
+              <a:t> </a:t>
+            </a:r>
+            <a:r>
+              <a:rPr kumimoji="0" lang="en-US" altLang="en-US" sz="1600" b="0" i="0" u="none" strike="noStrike" cap="none" normalizeH="0" baseline="0" dirty="0">
+                <a:ln>
+                  <a:noFill/>
+                </a:ln>
+                <a:solidFill>
+                  <a:srgbClr val="000000"/>
+                </a:solidFill>
+                <a:effectLst/>
+                <a:latin typeface="Consolas" panose="020B0609020204030204" pitchFamily="49" charset="0"/>
+              </a:rPr>
+              <a:t>rand_int2 = </a:t>
+            </a:r>
+            <a:r>
+              <a:rPr kumimoji="0" lang="en-US" altLang="en-US" sz="1600" b="0" i="0" u="none" strike="noStrike" cap="none" normalizeH="0" baseline="0" dirty="0" err="1">
+                <a:ln>
+                  <a:noFill/>
+                </a:ln>
+                <a:solidFill>
+                  <a:srgbClr val="000000"/>
+                </a:solidFill>
+                <a:effectLst/>
+                <a:latin typeface="Consolas" panose="020B0609020204030204" pitchFamily="49" charset="0"/>
+              </a:rPr>
+              <a:t>rand.nextInt</a:t>
+            </a:r>
+            <a:r>
+              <a:rPr kumimoji="0" lang="en-US" altLang="en-US" sz="1600" b="0" i="0" u="none" strike="noStrike" cap="none" normalizeH="0" baseline="0" dirty="0">
+                <a:ln>
+                  <a:noFill/>
+                </a:ln>
+                <a:solidFill>
+                  <a:srgbClr val="000000"/>
+                </a:solidFill>
+                <a:effectLst/>
+                <a:latin typeface="Consolas" panose="020B0609020204030204" pitchFamily="49" charset="0"/>
+              </a:rPr>
+              <a:t>(</a:t>
+            </a:r>
+            <a:r>
+              <a:rPr kumimoji="0" lang="en-US" altLang="en-US" sz="1600" b="0" i="0" u="none" strike="noStrike" cap="none" normalizeH="0" baseline="0" dirty="0">
+                <a:ln>
+                  <a:noFill/>
+                </a:ln>
+                <a:solidFill>
+                  <a:srgbClr val="009900"/>
+                </a:solidFill>
+                <a:effectLst/>
+                <a:latin typeface="Consolas" panose="020B0609020204030204" pitchFamily="49" charset="0"/>
+              </a:rPr>
+              <a:t>1000</a:t>
+            </a:r>
+            <a:r>
+              <a:rPr kumimoji="0" lang="en-US" altLang="en-US" sz="1600" b="0" i="0" u="none" strike="noStrike" cap="none" normalizeH="0" baseline="0" dirty="0">
+                <a:ln>
+                  <a:noFill/>
+                </a:ln>
+                <a:solidFill>
+                  <a:srgbClr val="000000"/>
+                </a:solidFill>
+                <a:effectLst/>
+                <a:latin typeface="Consolas" panose="020B0609020204030204" pitchFamily="49" charset="0"/>
+              </a:rPr>
+              <a:t>);</a:t>
+            </a:r>
+            <a:endParaRPr kumimoji="0" lang="en-US" altLang="en-US" sz="700" b="0" i="0" u="none" strike="noStrike" cap="none" normalizeH="0" baseline="0" dirty="0">
+              <a:ln>
+                <a:noFill/>
+              </a:ln>
+              <a:solidFill>
+                <a:schemeClr val="tx1"/>
+              </a:solidFill>
+              <a:effectLst/>
+            </a:endParaRPr>
+          </a:p>
+          <a:p>
+            <a:pPr marL="0" marR="0" lvl="0" indent="0" algn="l" defTabSz="914400" rtl="0" eaLnBrk="0" fontAlgn="base" latinLnBrk="0" hangingPunct="0">
+              <a:lnSpc>
+                <a:spcPct val="100000"/>
+              </a:lnSpc>
+              <a:spcBef>
+                <a:spcPct val="0"/>
+              </a:spcBef>
+              <a:spcAft>
+                <a:spcPct val="0"/>
+              </a:spcAft>
+              <a:buClrTx/>
+              <a:buSzTx/>
+              <a:buFontTx/>
+              <a:buNone/>
+              <a:tabLst/>
+            </a:pPr>
+            <a:r>
+              <a:rPr kumimoji="0" lang="en-US" altLang="en-US" sz="1600" b="0" i="0" u="none" strike="noStrike" cap="none" normalizeH="0" baseline="0" dirty="0">
+                <a:ln>
+                  <a:noFill/>
+                </a:ln>
+                <a:solidFill>
+                  <a:srgbClr val="273239"/>
+                </a:solidFill>
+                <a:effectLst/>
+                <a:latin typeface="Consolas" panose="020B0609020204030204" pitchFamily="49" charset="0"/>
+              </a:rPr>
+              <a:t>  </a:t>
+            </a:r>
+            <a:r>
+              <a:rPr kumimoji="0" lang="en-US" altLang="en-US" sz="700" b="0" i="0" u="none" strike="noStrike" cap="none" normalizeH="0" baseline="0" dirty="0">
+                <a:ln>
+                  <a:noFill/>
+                </a:ln>
+                <a:solidFill>
+                  <a:srgbClr val="273239"/>
+                </a:solidFill>
+                <a:effectLst/>
+                <a:latin typeface="Consolas" panose="020B0609020204030204" pitchFamily="49" charset="0"/>
+              </a:rPr>
+              <a:t> </a:t>
+            </a:r>
+            <a:endParaRPr kumimoji="0" lang="en-US" altLang="en-US" sz="2800" b="0" i="0" u="none" strike="noStrike" cap="none" normalizeH="0" baseline="0" dirty="0">
+              <a:ln>
+                <a:noFill/>
+              </a:ln>
+              <a:solidFill>
+                <a:schemeClr val="tx1"/>
+              </a:solidFill>
+              <a:effectLst/>
+            </a:endParaRPr>
+          </a:p>
+          <a:p>
+            <a:pPr marL="0" marR="0" lvl="0" indent="0" algn="l" defTabSz="914400" rtl="0" eaLnBrk="0" fontAlgn="base" latinLnBrk="0" hangingPunct="0">
+              <a:lnSpc>
+                <a:spcPct val="100000"/>
+              </a:lnSpc>
+              <a:spcBef>
+                <a:spcPct val="0"/>
+              </a:spcBef>
+              <a:spcAft>
+                <a:spcPct val="0"/>
+              </a:spcAft>
+              <a:buClrTx/>
+              <a:buSzTx/>
+              <a:buFontTx/>
+              <a:buNone/>
+              <a:tabLst/>
+            </a:pPr>
+            <a:r>
+              <a:rPr kumimoji="0" lang="en-US" altLang="en-US" sz="1600" b="0" i="0" u="none" strike="noStrike" cap="none" normalizeH="0" baseline="0" dirty="0">
+                <a:ln>
+                  <a:noFill/>
+                </a:ln>
+                <a:solidFill>
+                  <a:srgbClr val="273239"/>
+                </a:solidFill>
+                <a:effectLst/>
+                <a:latin typeface="Consolas" panose="020B0609020204030204" pitchFamily="49" charset="0"/>
+              </a:rPr>
+              <a:t>        </a:t>
+            </a:r>
+            <a:r>
+              <a:rPr kumimoji="0" lang="en-US" altLang="en-US" sz="1600" b="0" i="0" u="none" strike="noStrike" cap="none" normalizeH="0" baseline="0" dirty="0">
+                <a:ln>
+                  <a:noFill/>
+                </a:ln>
+                <a:solidFill>
+                  <a:srgbClr val="008200"/>
+                </a:solidFill>
+                <a:effectLst/>
+                <a:latin typeface="Consolas" panose="020B0609020204030204" pitchFamily="49" charset="0"/>
+              </a:rPr>
+              <a:t>// Print random integers</a:t>
+            </a:r>
+            <a:endParaRPr kumimoji="0" lang="en-US" altLang="en-US" sz="700" b="0" i="0" u="none" strike="noStrike" cap="none" normalizeH="0" baseline="0" dirty="0">
+              <a:ln>
+                <a:noFill/>
+              </a:ln>
+              <a:solidFill>
+                <a:schemeClr val="tx1"/>
+              </a:solidFill>
+              <a:effectLst/>
+            </a:endParaRPr>
+          </a:p>
+          <a:p>
+            <a:pPr marL="0" marR="0" lvl="0" indent="0" algn="l" defTabSz="914400" rtl="0" eaLnBrk="0" fontAlgn="base" latinLnBrk="0" hangingPunct="0">
+              <a:lnSpc>
+                <a:spcPct val="100000"/>
+              </a:lnSpc>
+              <a:spcBef>
+                <a:spcPct val="0"/>
+              </a:spcBef>
+              <a:spcAft>
+                <a:spcPct val="0"/>
+              </a:spcAft>
+              <a:buClrTx/>
+              <a:buSzTx/>
+              <a:buFontTx/>
+              <a:buNone/>
+              <a:tabLst/>
+            </a:pPr>
+            <a:r>
+              <a:rPr kumimoji="0" lang="en-US" altLang="en-US" sz="1600" b="0" i="0" u="none" strike="noStrike" cap="none" normalizeH="0" baseline="0" dirty="0">
+                <a:ln>
+                  <a:noFill/>
+                </a:ln>
+                <a:solidFill>
+                  <a:srgbClr val="273239"/>
+                </a:solidFill>
+                <a:effectLst/>
+                <a:latin typeface="Consolas" panose="020B0609020204030204" pitchFamily="49" charset="0"/>
+              </a:rPr>
+              <a:t>        </a:t>
+            </a:r>
+            <a:r>
+              <a:rPr kumimoji="0" lang="en-US" altLang="en-US" sz="1600" b="0" i="0" u="none" strike="noStrike" cap="none" normalizeH="0" baseline="0" dirty="0" err="1">
+                <a:ln>
+                  <a:noFill/>
+                </a:ln>
+                <a:solidFill>
+                  <a:srgbClr val="000000"/>
+                </a:solidFill>
+                <a:effectLst/>
+                <a:latin typeface="Consolas" panose="020B0609020204030204" pitchFamily="49" charset="0"/>
+              </a:rPr>
+              <a:t>System.out.println</a:t>
+            </a:r>
+            <a:r>
+              <a:rPr kumimoji="0" lang="en-US" altLang="en-US" sz="1600" b="0" i="0" u="none" strike="noStrike" cap="none" normalizeH="0" baseline="0" dirty="0">
+                <a:ln>
+                  <a:noFill/>
+                </a:ln>
+                <a:solidFill>
+                  <a:srgbClr val="000000"/>
+                </a:solidFill>
+                <a:effectLst/>
+                <a:latin typeface="Consolas" panose="020B0609020204030204" pitchFamily="49" charset="0"/>
+              </a:rPr>
+              <a:t>(</a:t>
+            </a:r>
+            <a:r>
+              <a:rPr kumimoji="0" lang="en-US" altLang="en-US" sz="1600" b="0" i="0" u="none" strike="noStrike" cap="none" normalizeH="0" baseline="0" dirty="0">
+                <a:ln>
+                  <a:noFill/>
+                </a:ln>
+                <a:solidFill>
+                  <a:srgbClr val="0000FF"/>
+                </a:solidFill>
+                <a:effectLst/>
+                <a:latin typeface="Consolas" panose="020B0609020204030204" pitchFamily="49" charset="0"/>
+              </a:rPr>
+              <a:t>"Random Integers: "</a:t>
+            </a:r>
+            <a:r>
+              <a:rPr kumimoji="0" lang="en-US" altLang="en-US" sz="1600" b="0" i="0" u="none" strike="noStrike" cap="none" normalizeH="0" baseline="0" dirty="0">
+                <a:ln>
+                  <a:noFill/>
+                </a:ln>
+                <a:solidFill>
+                  <a:srgbClr val="000000"/>
+                </a:solidFill>
+                <a:effectLst/>
+                <a:latin typeface="Consolas" panose="020B0609020204030204" pitchFamily="49" charset="0"/>
+              </a:rPr>
+              <a:t>+rand_int1);</a:t>
+            </a:r>
+            <a:endParaRPr kumimoji="0" lang="en-US" altLang="en-US" sz="700" b="0" i="0" u="none" strike="noStrike" cap="none" normalizeH="0" baseline="0" dirty="0">
+              <a:ln>
+                <a:noFill/>
+              </a:ln>
+              <a:solidFill>
+                <a:schemeClr val="tx1"/>
+              </a:solidFill>
+              <a:effectLst/>
+            </a:endParaRPr>
+          </a:p>
+          <a:p>
+            <a:pPr marL="0" marR="0" lvl="0" indent="0" algn="l" defTabSz="914400" rtl="0" eaLnBrk="0" fontAlgn="base" latinLnBrk="0" hangingPunct="0">
+              <a:lnSpc>
+                <a:spcPct val="100000"/>
+              </a:lnSpc>
+              <a:spcBef>
+                <a:spcPct val="0"/>
+              </a:spcBef>
+              <a:spcAft>
+                <a:spcPct val="0"/>
+              </a:spcAft>
+              <a:buClrTx/>
+              <a:buSzTx/>
+              <a:buFontTx/>
+              <a:buNone/>
+              <a:tabLst/>
+            </a:pPr>
+            <a:r>
+              <a:rPr kumimoji="0" lang="en-US" altLang="en-US" sz="1600" b="0" i="0" u="none" strike="noStrike" cap="none" normalizeH="0" baseline="0" dirty="0">
+                <a:ln>
+                  <a:noFill/>
+                </a:ln>
+                <a:solidFill>
+                  <a:srgbClr val="273239"/>
+                </a:solidFill>
+                <a:effectLst/>
+                <a:latin typeface="Consolas" panose="020B0609020204030204" pitchFamily="49" charset="0"/>
+              </a:rPr>
+              <a:t>        </a:t>
+            </a:r>
+            <a:r>
+              <a:rPr kumimoji="0" lang="en-US" altLang="en-US" sz="1600" b="0" i="0" u="none" strike="noStrike" cap="none" normalizeH="0" baseline="0" dirty="0" err="1">
+                <a:ln>
+                  <a:noFill/>
+                </a:ln>
+                <a:solidFill>
+                  <a:srgbClr val="000000"/>
+                </a:solidFill>
+                <a:effectLst/>
+                <a:latin typeface="Consolas" panose="020B0609020204030204" pitchFamily="49" charset="0"/>
+              </a:rPr>
+              <a:t>System.out.println</a:t>
+            </a:r>
+            <a:r>
+              <a:rPr kumimoji="0" lang="en-US" altLang="en-US" sz="1600" b="0" i="0" u="none" strike="noStrike" cap="none" normalizeH="0" baseline="0" dirty="0">
+                <a:ln>
+                  <a:noFill/>
+                </a:ln>
+                <a:solidFill>
+                  <a:srgbClr val="000000"/>
+                </a:solidFill>
+                <a:effectLst/>
+                <a:latin typeface="Consolas" panose="020B0609020204030204" pitchFamily="49" charset="0"/>
+              </a:rPr>
+              <a:t>(</a:t>
+            </a:r>
+            <a:r>
+              <a:rPr kumimoji="0" lang="en-US" altLang="en-US" sz="1600" b="0" i="0" u="none" strike="noStrike" cap="none" normalizeH="0" baseline="0" dirty="0">
+                <a:ln>
+                  <a:noFill/>
+                </a:ln>
+                <a:solidFill>
+                  <a:srgbClr val="0000FF"/>
+                </a:solidFill>
+                <a:effectLst/>
+                <a:latin typeface="Consolas" panose="020B0609020204030204" pitchFamily="49" charset="0"/>
+              </a:rPr>
+              <a:t>"Random Integers: "</a:t>
+            </a:r>
+            <a:r>
+              <a:rPr kumimoji="0" lang="en-US" altLang="en-US" sz="1600" b="0" i="0" u="none" strike="noStrike" cap="none" normalizeH="0" baseline="0" dirty="0">
+                <a:ln>
+                  <a:noFill/>
+                </a:ln>
+                <a:solidFill>
+                  <a:srgbClr val="000000"/>
+                </a:solidFill>
+                <a:effectLst/>
+                <a:latin typeface="Consolas" panose="020B0609020204030204" pitchFamily="49" charset="0"/>
+              </a:rPr>
+              <a:t>+rand_int2);</a:t>
+            </a:r>
+            <a:endParaRPr kumimoji="0" lang="en-US" altLang="en-US" sz="700" b="0" i="0" u="none" strike="noStrike" cap="none" normalizeH="0" baseline="0" dirty="0">
+              <a:ln>
+                <a:noFill/>
+              </a:ln>
+              <a:solidFill>
+                <a:schemeClr val="tx1"/>
+              </a:solidFill>
+              <a:effectLst/>
+            </a:endParaRPr>
+          </a:p>
+          <a:p>
+            <a:pPr marL="0" marR="0" lvl="0" indent="0" algn="l" defTabSz="914400" rtl="0" eaLnBrk="0" fontAlgn="base" latinLnBrk="0" hangingPunct="0">
+              <a:lnSpc>
+                <a:spcPct val="100000"/>
+              </a:lnSpc>
+              <a:spcBef>
+                <a:spcPct val="0"/>
+              </a:spcBef>
+              <a:spcAft>
+                <a:spcPct val="0"/>
+              </a:spcAft>
+              <a:buClrTx/>
+              <a:buSzTx/>
+              <a:buFontTx/>
+              <a:buNone/>
+              <a:tabLst/>
+            </a:pPr>
+            <a:r>
+              <a:rPr kumimoji="0" lang="en-US" altLang="en-US" sz="1600" b="0" i="0" u="none" strike="noStrike" cap="none" normalizeH="0" baseline="0" dirty="0">
+                <a:ln>
+                  <a:noFill/>
+                </a:ln>
+                <a:solidFill>
+                  <a:srgbClr val="273239"/>
+                </a:solidFill>
+                <a:effectLst/>
+                <a:latin typeface="Consolas" panose="020B0609020204030204" pitchFamily="49" charset="0"/>
+              </a:rPr>
+              <a:t>  </a:t>
+            </a:r>
+            <a:r>
+              <a:rPr kumimoji="0" lang="en-US" altLang="en-US" sz="700" b="0" i="0" u="none" strike="noStrike" cap="none" normalizeH="0" baseline="0" dirty="0">
+                <a:ln>
+                  <a:noFill/>
+                </a:ln>
+                <a:solidFill>
+                  <a:srgbClr val="273239"/>
+                </a:solidFill>
+                <a:effectLst/>
+                <a:latin typeface="Consolas" panose="020B0609020204030204" pitchFamily="49" charset="0"/>
+              </a:rPr>
+              <a:t> </a:t>
+            </a:r>
+            <a:endParaRPr kumimoji="0" lang="en-US" altLang="en-US" sz="2800" b="0" i="0" u="none" strike="noStrike" cap="none" normalizeH="0" baseline="0" dirty="0">
+              <a:ln>
+                <a:noFill/>
+              </a:ln>
+              <a:solidFill>
+                <a:schemeClr val="tx1"/>
+              </a:solidFill>
+              <a:effectLst/>
+            </a:endParaRPr>
+          </a:p>
+          <a:p>
+            <a:pPr marL="0" marR="0" lvl="0" indent="0" algn="l" defTabSz="914400" rtl="0" eaLnBrk="0" fontAlgn="base" latinLnBrk="0" hangingPunct="0">
+              <a:lnSpc>
+                <a:spcPct val="100000"/>
+              </a:lnSpc>
+              <a:spcBef>
+                <a:spcPct val="0"/>
+              </a:spcBef>
+              <a:spcAft>
+                <a:spcPct val="0"/>
+              </a:spcAft>
+              <a:buClrTx/>
+              <a:buSzTx/>
+              <a:buFontTx/>
+              <a:buNone/>
+              <a:tabLst/>
+            </a:pPr>
+            <a:r>
+              <a:rPr kumimoji="0" lang="en-US" altLang="en-US" sz="1600" b="0" i="0" u="none" strike="noStrike" cap="none" normalizeH="0" baseline="0" dirty="0">
+                <a:ln>
+                  <a:noFill/>
+                </a:ln>
+                <a:solidFill>
+                  <a:srgbClr val="273239"/>
+                </a:solidFill>
+                <a:effectLst/>
+                <a:latin typeface="Consolas" panose="020B0609020204030204" pitchFamily="49" charset="0"/>
+              </a:rPr>
+              <a:t>        </a:t>
+            </a:r>
+            <a:r>
+              <a:rPr kumimoji="0" lang="en-US" altLang="en-US" sz="1600" b="0" i="0" u="none" strike="noStrike" cap="none" normalizeH="0" baseline="0" dirty="0">
+                <a:ln>
+                  <a:noFill/>
+                </a:ln>
+                <a:solidFill>
+                  <a:srgbClr val="008200"/>
+                </a:solidFill>
+                <a:effectLst/>
+                <a:latin typeface="Consolas" panose="020B0609020204030204" pitchFamily="49" charset="0"/>
+              </a:rPr>
+              <a:t>// Generate Random doubles</a:t>
+            </a:r>
+            <a:endParaRPr kumimoji="0" lang="en-US" altLang="en-US" sz="700" b="0" i="0" u="none" strike="noStrike" cap="none" normalizeH="0" baseline="0" dirty="0">
+              <a:ln>
+                <a:noFill/>
+              </a:ln>
+              <a:solidFill>
+                <a:schemeClr val="tx1"/>
+              </a:solidFill>
+              <a:effectLst/>
+            </a:endParaRPr>
+          </a:p>
+          <a:p>
+            <a:pPr marL="0" marR="0" lvl="0" indent="0" algn="l" defTabSz="914400" rtl="0" eaLnBrk="0" fontAlgn="base" latinLnBrk="0" hangingPunct="0">
+              <a:lnSpc>
+                <a:spcPct val="100000"/>
+              </a:lnSpc>
+              <a:spcBef>
+                <a:spcPct val="0"/>
+              </a:spcBef>
+              <a:spcAft>
+                <a:spcPct val="0"/>
+              </a:spcAft>
+              <a:buClrTx/>
+              <a:buSzTx/>
+              <a:buFontTx/>
+              <a:buNone/>
+              <a:tabLst/>
+            </a:pPr>
+            <a:r>
+              <a:rPr kumimoji="0" lang="en-US" altLang="en-US" sz="1600" b="0" i="0" u="none" strike="noStrike" cap="none" normalizeH="0" baseline="0" dirty="0">
+                <a:ln>
+                  <a:noFill/>
+                </a:ln>
+                <a:solidFill>
+                  <a:srgbClr val="273239"/>
+                </a:solidFill>
+                <a:effectLst/>
+                <a:latin typeface="Consolas" panose="020B0609020204030204" pitchFamily="49" charset="0"/>
+              </a:rPr>
+              <a:t>        </a:t>
+            </a:r>
+            <a:r>
+              <a:rPr kumimoji="0" lang="en-US" altLang="en-US" sz="1600" b="1" i="0" u="none" strike="noStrike" cap="none" normalizeH="0" baseline="0" dirty="0">
+                <a:ln>
+                  <a:noFill/>
+                </a:ln>
+                <a:solidFill>
+                  <a:srgbClr val="006699"/>
+                </a:solidFill>
+                <a:effectLst/>
+                <a:latin typeface="Consolas" panose="020B0609020204030204" pitchFamily="49" charset="0"/>
+              </a:rPr>
+              <a:t>double</a:t>
+            </a:r>
+            <a:r>
+              <a:rPr kumimoji="0" lang="en-US" altLang="en-US" sz="700" b="0" i="0" u="none" strike="noStrike" cap="none" normalizeH="0" baseline="0" dirty="0">
+                <a:ln>
+                  <a:noFill/>
+                </a:ln>
+                <a:solidFill>
+                  <a:srgbClr val="273239"/>
+                </a:solidFill>
+                <a:effectLst/>
+                <a:latin typeface="Consolas" panose="020B0609020204030204" pitchFamily="49" charset="0"/>
+              </a:rPr>
+              <a:t> </a:t>
+            </a:r>
+            <a:r>
+              <a:rPr kumimoji="0" lang="en-US" altLang="en-US" sz="1600" b="0" i="0" u="none" strike="noStrike" cap="none" normalizeH="0" baseline="0" dirty="0">
+                <a:ln>
+                  <a:noFill/>
+                </a:ln>
+                <a:solidFill>
+                  <a:srgbClr val="000000"/>
+                </a:solidFill>
+                <a:effectLst/>
+                <a:latin typeface="Consolas" panose="020B0609020204030204" pitchFamily="49" charset="0"/>
+              </a:rPr>
+              <a:t>rand_dub1 = </a:t>
+            </a:r>
+            <a:r>
+              <a:rPr kumimoji="0" lang="en-US" altLang="en-US" sz="1600" b="0" i="0" u="none" strike="noStrike" cap="none" normalizeH="0" baseline="0" dirty="0" err="1">
+                <a:ln>
+                  <a:noFill/>
+                </a:ln>
+                <a:solidFill>
+                  <a:srgbClr val="000000"/>
+                </a:solidFill>
+                <a:effectLst/>
+                <a:latin typeface="Consolas" panose="020B0609020204030204" pitchFamily="49" charset="0"/>
+              </a:rPr>
+              <a:t>rand.nextDouble</a:t>
+            </a:r>
+            <a:r>
+              <a:rPr kumimoji="0" lang="en-US" altLang="en-US" sz="1600" b="0" i="0" u="none" strike="noStrike" cap="none" normalizeH="0" baseline="0" dirty="0">
+                <a:ln>
+                  <a:noFill/>
+                </a:ln>
+                <a:solidFill>
+                  <a:srgbClr val="000000"/>
+                </a:solidFill>
+                <a:effectLst/>
+                <a:latin typeface="Consolas" panose="020B0609020204030204" pitchFamily="49" charset="0"/>
+              </a:rPr>
+              <a:t>();</a:t>
+            </a:r>
+            <a:endParaRPr kumimoji="0" lang="en-US" altLang="en-US" sz="700" b="0" i="0" u="none" strike="noStrike" cap="none" normalizeH="0" baseline="0" dirty="0">
+              <a:ln>
+                <a:noFill/>
+              </a:ln>
+              <a:solidFill>
+                <a:schemeClr val="tx1"/>
+              </a:solidFill>
+              <a:effectLst/>
+            </a:endParaRPr>
+          </a:p>
+          <a:p>
+            <a:pPr marL="0" marR="0" lvl="0" indent="0" algn="l" defTabSz="914400" rtl="0" eaLnBrk="0" fontAlgn="base" latinLnBrk="0" hangingPunct="0">
+              <a:lnSpc>
+                <a:spcPct val="100000"/>
+              </a:lnSpc>
+              <a:spcBef>
+                <a:spcPct val="0"/>
+              </a:spcBef>
+              <a:spcAft>
+                <a:spcPct val="0"/>
+              </a:spcAft>
+              <a:buClrTx/>
+              <a:buSzTx/>
+              <a:buFontTx/>
+              <a:buNone/>
+              <a:tabLst/>
+            </a:pPr>
+            <a:r>
+              <a:rPr kumimoji="0" lang="en-US" altLang="en-US" sz="1600" b="0" i="0" u="none" strike="noStrike" cap="none" normalizeH="0" baseline="0" dirty="0">
+                <a:ln>
+                  <a:noFill/>
+                </a:ln>
+                <a:solidFill>
+                  <a:srgbClr val="273239"/>
+                </a:solidFill>
+                <a:effectLst/>
+                <a:latin typeface="Consolas" panose="020B0609020204030204" pitchFamily="49" charset="0"/>
+              </a:rPr>
+              <a:t>        </a:t>
+            </a:r>
+            <a:r>
+              <a:rPr kumimoji="0" lang="en-US" altLang="en-US" sz="1600" b="1" i="0" u="none" strike="noStrike" cap="none" normalizeH="0" baseline="0" dirty="0">
+                <a:ln>
+                  <a:noFill/>
+                </a:ln>
+                <a:solidFill>
+                  <a:srgbClr val="006699"/>
+                </a:solidFill>
+                <a:effectLst/>
+                <a:latin typeface="Consolas" panose="020B0609020204030204" pitchFamily="49" charset="0"/>
+              </a:rPr>
+              <a:t>double</a:t>
+            </a:r>
+            <a:r>
+              <a:rPr kumimoji="0" lang="en-US" altLang="en-US" sz="700" b="0" i="0" u="none" strike="noStrike" cap="none" normalizeH="0" baseline="0" dirty="0">
+                <a:ln>
+                  <a:noFill/>
+                </a:ln>
+                <a:solidFill>
+                  <a:srgbClr val="273239"/>
+                </a:solidFill>
+                <a:effectLst/>
+                <a:latin typeface="Consolas" panose="020B0609020204030204" pitchFamily="49" charset="0"/>
+              </a:rPr>
+              <a:t> </a:t>
+            </a:r>
+            <a:r>
+              <a:rPr kumimoji="0" lang="en-US" altLang="en-US" sz="1600" b="0" i="0" u="none" strike="noStrike" cap="none" normalizeH="0" baseline="0" dirty="0">
+                <a:ln>
+                  <a:noFill/>
+                </a:ln>
+                <a:solidFill>
+                  <a:srgbClr val="000000"/>
+                </a:solidFill>
+                <a:effectLst/>
+                <a:latin typeface="Consolas" panose="020B0609020204030204" pitchFamily="49" charset="0"/>
+              </a:rPr>
+              <a:t>rand_dub2 = </a:t>
+            </a:r>
+            <a:r>
+              <a:rPr kumimoji="0" lang="en-US" altLang="en-US" sz="1600" b="0" i="0" u="none" strike="noStrike" cap="none" normalizeH="0" baseline="0" dirty="0" err="1">
+                <a:ln>
+                  <a:noFill/>
+                </a:ln>
+                <a:solidFill>
+                  <a:srgbClr val="000000"/>
+                </a:solidFill>
+                <a:effectLst/>
+                <a:latin typeface="Consolas" panose="020B0609020204030204" pitchFamily="49" charset="0"/>
+              </a:rPr>
+              <a:t>rand.nextDouble</a:t>
+            </a:r>
+            <a:r>
+              <a:rPr kumimoji="0" lang="en-US" altLang="en-US" sz="1600" b="0" i="0" u="none" strike="noStrike" cap="none" normalizeH="0" baseline="0" dirty="0">
+                <a:ln>
+                  <a:noFill/>
+                </a:ln>
+                <a:solidFill>
+                  <a:srgbClr val="000000"/>
+                </a:solidFill>
+                <a:effectLst/>
+                <a:latin typeface="Consolas" panose="020B0609020204030204" pitchFamily="49" charset="0"/>
+              </a:rPr>
+              <a:t>();</a:t>
+            </a:r>
+            <a:endParaRPr kumimoji="0" lang="en-US" altLang="en-US" sz="700" b="0" i="0" u="none" strike="noStrike" cap="none" normalizeH="0" baseline="0" dirty="0">
+              <a:ln>
+                <a:noFill/>
+              </a:ln>
+              <a:solidFill>
+                <a:schemeClr val="tx1"/>
+              </a:solidFill>
+              <a:effectLst/>
+            </a:endParaRPr>
+          </a:p>
+          <a:p>
+            <a:pPr marL="0" marR="0" lvl="0" indent="0" algn="l" defTabSz="914400" rtl="0" eaLnBrk="0" fontAlgn="base" latinLnBrk="0" hangingPunct="0">
+              <a:lnSpc>
+                <a:spcPct val="100000"/>
+              </a:lnSpc>
+              <a:spcBef>
+                <a:spcPct val="0"/>
+              </a:spcBef>
+              <a:spcAft>
+                <a:spcPct val="0"/>
+              </a:spcAft>
+              <a:buClrTx/>
+              <a:buSzTx/>
+              <a:buFontTx/>
+              <a:buNone/>
+              <a:tabLst/>
+            </a:pPr>
+            <a:r>
+              <a:rPr kumimoji="0" lang="en-US" altLang="en-US" sz="1600" b="0" i="0" u="none" strike="noStrike" cap="none" normalizeH="0" baseline="0" dirty="0">
+                <a:ln>
+                  <a:noFill/>
+                </a:ln>
+                <a:solidFill>
+                  <a:srgbClr val="273239"/>
+                </a:solidFill>
+                <a:effectLst/>
+                <a:latin typeface="Consolas" panose="020B0609020204030204" pitchFamily="49" charset="0"/>
+              </a:rPr>
+              <a:t>  </a:t>
+            </a:r>
+            <a:r>
+              <a:rPr kumimoji="0" lang="en-US" altLang="en-US" sz="700" b="0" i="0" u="none" strike="noStrike" cap="none" normalizeH="0" baseline="0" dirty="0">
+                <a:ln>
+                  <a:noFill/>
+                </a:ln>
+                <a:solidFill>
+                  <a:srgbClr val="273239"/>
+                </a:solidFill>
+                <a:effectLst/>
+                <a:latin typeface="Consolas" panose="020B0609020204030204" pitchFamily="49" charset="0"/>
+              </a:rPr>
+              <a:t> </a:t>
+            </a:r>
+            <a:endParaRPr kumimoji="0" lang="en-US" altLang="en-US" sz="2800" b="0" i="0" u="none" strike="noStrike" cap="none" normalizeH="0" baseline="0" dirty="0">
+              <a:ln>
+                <a:noFill/>
+              </a:ln>
+              <a:solidFill>
+                <a:schemeClr val="tx1"/>
+              </a:solidFill>
+              <a:effectLst/>
+            </a:endParaRPr>
+          </a:p>
+          <a:p>
+            <a:pPr marL="0" marR="0" lvl="0" indent="0" algn="l" defTabSz="914400" rtl="0" eaLnBrk="0" fontAlgn="base" latinLnBrk="0" hangingPunct="0">
+              <a:lnSpc>
+                <a:spcPct val="100000"/>
+              </a:lnSpc>
+              <a:spcBef>
+                <a:spcPct val="0"/>
+              </a:spcBef>
+              <a:spcAft>
+                <a:spcPct val="0"/>
+              </a:spcAft>
+              <a:buClrTx/>
+              <a:buSzTx/>
+              <a:buFontTx/>
+              <a:buNone/>
+              <a:tabLst/>
+            </a:pPr>
+            <a:r>
+              <a:rPr kumimoji="0" lang="en-US" altLang="en-US" sz="1600" b="0" i="0" u="none" strike="noStrike" cap="none" normalizeH="0" baseline="0" dirty="0">
+                <a:ln>
+                  <a:noFill/>
+                </a:ln>
+                <a:solidFill>
+                  <a:srgbClr val="273239"/>
+                </a:solidFill>
+                <a:effectLst/>
+                <a:latin typeface="Consolas" panose="020B0609020204030204" pitchFamily="49" charset="0"/>
+              </a:rPr>
+              <a:t>        </a:t>
+            </a:r>
+            <a:r>
+              <a:rPr kumimoji="0" lang="en-US" altLang="en-US" sz="1600" b="0" i="0" u="none" strike="noStrike" cap="none" normalizeH="0" baseline="0" dirty="0">
+                <a:ln>
+                  <a:noFill/>
+                </a:ln>
+                <a:solidFill>
+                  <a:srgbClr val="008200"/>
+                </a:solidFill>
+                <a:effectLst/>
+                <a:latin typeface="Consolas" panose="020B0609020204030204" pitchFamily="49" charset="0"/>
+              </a:rPr>
+              <a:t>// Print random doubles</a:t>
+            </a:r>
+            <a:endParaRPr kumimoji="0" lang="en-US" altLang="en-US" sz="700" b="0" i="0" u="none" strike="noStrike" cap="none" normalizeH="0" baseline="0" dirty="0">
+              <a:ln>
+                <a:noFill/>
+              </a:ln>
+              <a:solidFill>
+                <a:schemeClr val="tx1"/>
+              </a:solidFill>
+              <a:effectLst/>
+            </a:endParaRPr>
+          </a:p>
+          <a:p>
+            <a:pPr marL="0" marR="0" lvl="0" indent="0" algn="l" defTabSz="914400" rtl="0" eaLnBrk="0" fontAlgn="base" latinLnBrk="0" hangingPunct="0">
+              <a:lnSpc>
+                <a:spcPct val="100000"/>
+              </a:lnSpc>
+              <a:spcBef>
+                <a:spcPct val="0"/>
+              </a:spcBef>
+              <a:spcAft>
+                <a:spcPct val="0"/>
+              </a:spcAft>
+              <a:buClrTx/>
+              <a:buSzTx/>
+              <a:buFontTx/>
+              <a:buNone/>
+              <a:tabLst/>
+            </a:pPr>
+            <a:r>
+              <a:rPr kumimoji="0" lang="en-US" altLang="en-US" sz="1600" b="0" i="0" u="none" strike="noStrike" cap="none" normalizeH="0" baseline="0" dirty="0">
+                <a:ln>
+                  <a:noFill/>
+                </a:ln>
+                <a:solidFill>
+                  <a:srgbClr val="273239"/>
+                </a:solidFill>
+                <a:effectLst/>
+                <a:latin typeface="Consolas" panose="020B0609020204030204" pitchFamily="49" charset="0"/>
+              </a:rPr>
+              <a:t>        </a:t>
+            </a:r>
+            <a:r>
+              <a:rPr kumimoji="0" lang="en-US" altLang="en-US" sz="1600" b="0" i="0" u="none" strike="noStrike" cap="none" normalizeH="0" baseline="0" dirty="0" err="1">
+                <a:ln>
+                  <a:noFill/>
+                </a:ln>
+                <a:solidFill>
+                  <a:srgbClr val="000000"/>
+                </a:solidFill>
+                <a:effectLst/>
+                <a:latin typeface="Consolas" panose="020B0609020204030204" pitchFamily="49" charset="0"/>
+              </a:rPr>
+              <a:t>System.out.println</a:t>
+            </a:r>
+            <a:r>
+              <a:rPr kumimoji="0" lang="en-US" altLang="en-US" sz="1600" b="0" i="0" u="none" strike="noStrike" cap="none" normalizeH="0" baseline="0" dirty="0">
+                <a:ln>
+                  <a:noFill/>
+                </a:ln>
+                <a:solidFill>
+                  <a:srgbClr val="000000"/>
+                </a:solidFill>
+                <a:effectLst/>
+                <a:latin typeface="Consolas" panose="020B0609020204030204" pitchFamily="49" charset="0"/>
+              </a:rPr>
+              <a:t>(</a:t>
+            </a:r>
+            <a:r>
+              <a:rPr kumimoji="0" lang="en-US" altLang="en-US" sz="1600" b="0" i="0" u="none" strike="noStrike" cap="none" normalizeH="0" baseline="0" dirty="0">
+                <a:ln>
+                  <a:noFill/>
+                </a:ln>
+                <a:solidFill>
+                  <a:srgbClr val="0000FF"/>
+                </a:solidFill>
+                <a:effectLst/>
+                <a:latin typeface="Consolas" panose="020B0609020204030204" pitchFamily="49" charset="0"/>
+              </a:rPr>
+              <a:t>"Random Doubles: "</a:t>
+            </a:r>
+            <a:r>
+              <a:rPr kumimoji="0" lang="en-US" altLang="en-US" sz="1600" b="0" i="0" u="none" strike="noStrike" cap="none" normalizeH="0" baseline="0" dirty="0">
+                <a:ln>
+                  <a:noFill/>
+                </a:ln>
+                <a:solidFill>
+                  <a:srgbClr val="000000"/>
+                </a:solidFill>
+                <a:effectLst/>
+                <a:latin typeface="Consolas" panose="020B0609020204030204" pitchFamily="49" charset="0"/>
+              </a:rPr>
+              <a:t>+rand_dub1);</a:t>
+            </a:r>
+            <a:endParaRPr kumimoji="0" lang="en-US" altLang="en-US" sz="700" b="0" i="0" u="none" strike="noStrike" cap="none" normalizeH="0" baseline="0" dirty="0">
+              <a:ln>
+                <a:noFill/>
+              </a:ln>
+              <a:solidFill>
+                <a:schemeClr val="tx1"/>
+              </a:solidFill>
+              <a:effectLst/>
+            </a:endParaRPr>
+          </a:p>
+          <a:p>
+            <a:pPr marL="0" marR="0" lvl="0" indent="0" algn="l" defTabSz="914400" rtl="0" eaLnBrk="0" fontAlgn="base" latinLnBrk="0" hangingPunct="0">
+              <a:lnSpc>
+                <a:spcPct val="100000"/>
+              </a:lnSpc>
+              <a:spcBef>
+                <a:spcPct val="0"/>
+              </a:spcBef>
+              <a:spcAft>
+                <a:spcPct val="0"/>
+              </a:spcAft>
+              <a:buClrTx/>
+              <a:buSzTx/>
+              <a:buFontTx/>
+              <a:buNone/>
+              <a:tabLst/>
+            </a:pPr>
+            <a:r>
+              <a:rPr kumimoji="0" lang="en-US" altLang="en-US" sz="1600" b="0" i="0" u="none" strike="noStrike" cap="none" normalizeH="0" baseline="0" dirty="0">
+                <a:ln>
+                  <a:noFill/>
+                </a:ln>
+                <a:solidFill>
+                  <a:srgbClr val="273239"/>
+                </a:solidFill>
+                <a:effectLst/>
+                <a:latin typeface="Consolas" panose="020B0609020204030204" pitchFamily="49" charset="0"/>
+              </a:rPr>
+              <a:t>        </a:t>
+            </a:r>
+            <a:r>
+              <a:rPr kumimoji="0" lang="en-US" altLang="en-US" sz="1600" b="0" i="0" u="none" strike="noStrike" cap="none" normalizeH="0" baseline="0" dirty="0" err="1">
+                <a:ln>
+                  <a:noFill/>
+                </a:ln>
+                <a:solidFill>
+                  <a:srgbClr val="000000"/>
+                </a:solidFill>
+                <a:effectLst/>
+                <a:latin typeface="Consolas" panose="020B0609020204030204" pitchFamily="49" charset="0"/>
+              </a:rPr>
+              <a:t>System.out.println</a:t>
+            </a:r>
+            <a:r>
+              <a:rPr kumimoji="0" lang="en-US" altLang="en-US" sz="1600" b="0" i="0" u="none" strike="noStrike" cap="none" normalizeH="0" baseline="0" dirty="0">
+                <a:ln>
+                  <a:noFill/>
+                </a:ln>
+                <a:solidFill>
+                  <a:srgbClr val="000000"/>
+                </a:solidFill>
+                <a:effectLst/>
+                <a:latin typeface="Consolas" panose="020B0609020204030204" pitchFamily="49" charset="0"/>
+              </a:rPr>
+              <a:t>(</a:t>
+            </a:r>
+            <a:r>
+              <a:rPr kumimoji="0" lang="en-US" altLang="en-US" sz="1600" b="0" i="0" u="none" strike="noStrike" cap="none" normalizeH="0" baseline="0" dirty="0">
+                <a:ln>
+                  <a:noFill/>
+                </a:ln>
+                <a:solidFill>
+                  <a:srgbClr val="0000FF"/>
+                </a:solidFill>
+                <a:effectLst/>
+                <a:latin typeface="Consolas" panose="020B0609020204030204" pitchFamily="49" charset="0"/>
+              </a:rPr>
+              <a:t>"Random Doubles: "</a:t>
+            </a:r>
+            <a:r>
+              <a:rPr kumimoji="0" lang="en-US" altLang="en-US" sz="1600" b="0" i="0" u="none" strike="noStrike" cap="none" normalizeH="0" baseline="0" dirty="0">
+                <a:ln>
+                  <a:noFill/>
+                </a:ln>
+                <a:solidFill>
+                  <a:srgbClr val="000000"/>
+                </a:solidFill>
+                <a:effectLst/>
+                <a:latin typeface="Consolas" panose="020B0609020204030204" pitchFamily="49" charset="0"/>
+              </a:rPr>
+              <a:t>+rand_dub2);</a:t>
+            </a:r>
+            <a:endParaRPr kumimoji="0" lang="en-US" altLang="en-US" sz="700" b="0" i="0" u="none" strike="noStrike" cap="none" normalizeH="0" baseline="0" dirty="0">
+              <a:ln>
+                <a:noFill/>
+              </a:ln>
+              <a:solidFill>
+                <a:schemeClr val="tx1"/>
+              </a:solidFill>
+              <a:effectLst/>
+            </a:endParaRPr>
+          </a:p>
+          <a:p>
+            <a:pPr marL="0" marR="0" lvl="0" indent="0" algn="l" defTabSz="914400" rtl="0" eaLnBrk="0" fontAlgn="base" latinLnBrk="0" hangingPunct="0">
+              <a:lnSpc>
+                <a:spcPct val="100000"/>
+              </a:lnSpc>
+              <a:spcBef>
+                <a:spcPct val="0"/>
+              </a:spcBef>
+              <a:spcAft>
+                <a:spcPct val="0"/>
+              </a:spcAft>
+              <a:buClrTx/>
+              <a:buSzTx/>
+              <a:buFontTx/>
+              <a:buNone/>
+              <a:tabLst/>
+            </a:pPr>
+            <a:r>
+              <a:rPr kumimoji="0" lang="en-US" altLang="en-US" sz="1600" b="0" i="0" u="none" strike="noStrike" cap="none" normalizeH="0" baseline="0" dirty="0">
+                <a:ln>
+                  <a:noFill/>
+                </a:ln>
+                <a:solidFill>
+                  <a:srgbClr val="273239"/>
+                </a:solidFill>
+                <a:effectLst/>
+                <a:latin typeface="Consolas" panose="020B0609020204030204" pitchFamily="49" charset="0"/>
+              </a:rPr>
+              <a:t>    </a:t>
+            </a:r>
+            <a:r>
+              <a:rPr kumimoji="0" lang="en-US" altLang="en-US" sz="1600" b="0" i="0" u="none" strike="noStrike" cap="none" normalizeH="0" baseline="0" dirty="0">
+                <a:ln>
+                  <a:noFill/>
+                </a:ln>
+                <a:solidFill>
+                  <a:srgbClr val="000000"/>
+                </a:solidFill>
+                <a:effectLst/>
+                <a:latin typeface="Consolas" panose="020B0609020204030204" pitchFamily="49" charset="0"/>
+              </a:rPr>
+              <a:t>}</a:t>
+            </a:r>
+            <a:endParaRPr kumimoji="0" lang="en-US" altLang="en-US" sz="2800" b="0" i="0" u="none" strike="noStrike" cap="none" normalizeH="0" baseline="0" dirty="0">
+              <a:ln>
+                <a:noFill/>
+              </a:ln>
+              <a:solidFill>
+                <a:schemeClr val="tx1"/>
+              </a:solidFill>
+              <a:effectLst/>
+              <a:latin typeface="Arial" panose="020B0604020202020204" pitchFamily="34" charset="0"/>
+            </a:endParaRPr>
+          </a:p>
+        </p:txBody>
+      </p:sp>
+      <p:sp>
+        <p:nvSpPr>
+          <p:cNvPr id="10" name="Rectangle 3">
+            <a:extLst>
+              <a:ext uri="{FF2B5EF4-FFF2-40B4-BE49-F238E27FC236}">
+                <a16:creationId xmlns:a16="http://schemas.microsoft.com/office/drawing/2014/main" id="{C6CA32A8-6233-460F-6345-5133340BE9F5}"/>
+              </a:ext>
+            </a:extLst>
+          </p:cNvPr>
+          <p:cNvSpPr>
+            <a:spLocks noChangeArrowheads="1"/>
+          </p:cNvSpPr>
+          <p:nvPr/>
+        </p:nvSpPr>
+        <p:spPr bwMode="auto">
+          <a:xfrm>
+            <a:off x="1314443" y="544840"/>
+            <a:ext cx="12192000" cy="457200"/>
+          </a:xfrm>
+          <a:prstGeom prst="rect">
+            <a:avLst/>
+          </a:prstGeom>
+          <a:noFill/>
+          <a:ln>
+            <a:noFill/>
+          </a:ln>
+          <a:effectLst/>
+          <a:extLst>
+            <a:ext uri="{909E8E84-426E-40DD-AFC4-6F175D3DCCD1}">
+              <a14:hiddenFill xmlns:a14="http://schemas.microsoft.com/office/drawing/2010/main">
+                <a:solidFill>
+                  <a:schemeClr val="accent1"/>
+                </a:solidFill>
+              </a14:hiddenFill>
+            </a:ext>
+            <a:ext uri="{91240B29-F687-4F45-9708-019B960494DF}">
+              <a14:hiddenLine xmlns:a14="http://schemas.microsoft.com/office/drawing/2010/main" w="9525">
+                <a:solidFill>
+                  <a:schemeClr val="tx1"/>
+                </a:solidFill>
+                <a:miter lim="800000"/>
+                <a:headEnd/>
+                <a:tailEnd/>
+              </a14:hiddenLine>
+            </a:ext>
+            <a:ext uri="{AF507438-7753-43E0-B8FC-AC1667EBCBE1}">
+              <a14:hiddenEffects xmlns:a14="http://schemas.microsoft.com/office/drawing/2010/main">
+                <a:effectLst>
+                  <a:outerShdw dist="35921" dir="2700000" algn="ctr" rotWithShape="0">
+                    <a:schemeClr val="bg2"/>
+                  </a:outerShdw>
+                </a:effectLst>
+              </a14:hiddenEffects>
+            </a:ext>
+          </a:extLst>
+        </p:spPr>
+        <p:txBody>
+          <a:bodyPr vert="horz" wrap="none" lIns="0" tIns="0" rIns="0" bIns="0" numCol="1" anchor="ctr" anchorCtr="0" compatLnSpc="1">
+            <a:prstTxWarp prst="textNoShape">
+              <a:avLst/>
+            </a:prstTxWarp>
+            <a:spAutoFit/>
+          </a:bodyPr>
+          <a:lstStyle>
+            <a:lvl1pPr algn="l" rtl="0" eaLnBrk="0" fontAlgn="base" hangingPunct="0">
+              <a:spcBef>
+                <a:spcPct val="0"/>
+              </a:spcBef>
+              <a:spcAft>
+                <a:spcPct val="0"/>
+              </a:spcAft>
+              <a:defRPr>
+                <a:solidFill>
+                  <a:schemeClr val="tx1"/>
+                </a:solidFill>
+                <a:latin typeface="Arial" panose="020B0604020202020204" pitchFamily="34" charset="0"/>
+              </a:defRPr>
+            </a:lvl1pPr>
+            <a:lvl2pPr marL="457200" algn="l" rtl="0" eaLnBrk="0" fontAlgn="base" hangingPunct="0">
+              <a:spcBef>
+                <a:spcPct val="0"/>
+              </a:spcBef>
+              <a:spcAft>
+                <a:spcPct val="0"/>
+              </a:spcAft>
+              <a:defRPr>
+                <a:solidFill>
+                  <a:schemeClr val="tx1"/>
+                </a:solidFill>
+                <a:latin typeface="Arial" panose="020B0604020202020204" pitchFamily="34" charset="0"/>
+              </a:defRPr>
+            </a:lvl2pPr>
+            <a:lvl3pPr marL="914400" algn="l" rtl="0" eaLnBrk="0" fontAlgn="base" hangingPunct="0">
+              <a:spcBef>
+                <a:spcPct val="0"/>
+              </a:spcBef>
+              <a:spcAft>
+                <a:spcPct val="0"/>
+              </a:spcAft>
+              <a:defRPr>
+                <a:solidFill>
+                  <a:schemeClr val="tx1"/>
+                </a:solidFill>
+                <a:latin typeface="Arial" panose="020B0604020202020204" pitchFamily="34" charset="0"/>
+              </a:defRPr>
+            </a:lvl3pPr>
+            <a:lvl4pPr marL="1371600" algn="l" rtl="0" eaLnBrk="0" fontAlgn="base" hangingPunct="0">
+              <a:spcBef>
+                <a:spcPct val="0"/>
+              </a:spcBef>
+              <a:spcAft>
+                <a:spcPct val="0"/>
+              </a:spcAft>
+              <a:defRPr>
+                <a:solidFill>
+                  <a:schemeClr val="tx1"/>
+                </a:solidFill>
+                <a:latin typeface="Arial" panose="020B0604020202020204" pitchFamily="34" charset="0"/>
+              </a:defRPr>
+            </a:lvl4pPr>
+            <a:lvl5pPr marL="1828800" algn="l" rtl="0" eaLnBrk="0" fontAlgn="base" hangingPunct="0">
+              <a:spcBef>
+                <a:spcPct val="0"/>
+              </a:spcBef>
+              <a:spcAft>
+                <a:spcPct val="0"/>
+              </a:spcAft>
+              <a:defRPr>
+                <a:solidFill>
+                  <a:schemeClr val="tx1"/>
+                </a:solidFill>
+                <a:latin typeface="Arial" panose="020B0604020202020204" pitchFamily="34" charset="0"/>
+              </a:defRPr>
+            </a:lvl5pPr>
+            <a:lvl6pPr marL="2286000" algn="l" rtl="0" eaLnBrk="0" fontAlgn="base" hangingPunct="0">
+              <a:spcBef>
+                <a:spcPct val="0"/>
+              </a:spcBef>
+              <a:spcAft>
+                <a:spcPct val="0"/>
+              </a:spcAft>
+              <a:defRPr>
+                <a:solidFill>
+                  <a:schemeClr val="tx1"/>
+                </a:solidFill>
+                <a:latin typeface="Arial" panose="020B0604020202020204" pitchFamily="34" charset="0"/>
+              </a:defRPr>
+            </a:lvl6pPr>
+            <a:lvl7pPr marL="2743200" algn="l" rtl="0" eaLnBrk="0" fontAlgn="base" hangingPunct="0">
+              <a:spcBef>
+                <a:spcPct val="0"/>
+              </a:spcBef>
+              <a:spcAft>
+                <a:spcPct val="0"/>
+              </a:spcAft>
+              <a:defRPr>
+                <a:solidFill>
+                  <a:schemeClr val="tx1"/>
+                </a:solidFill>
+                <a:latin typeface="Arial" panose="020B0604020202020204" pitchFamily="34" charset="0"/>
+              </a:defRPr>
+            </a:lvl7pPr>
+            <a:lvl8pPr marL="3200400" algn="l" rtl="0" eaLnBrk="0" fontAlgn="base" hangingPunct="0">
+              <a:spcBef>
+                <a:spcPct val="0"/>
+              </a:spcBef>
+              <a:spcAft>
+                <a:spcPct val="0"/>
+              </a:spcAft>
+              <a:defRPr>
+                <a:solidFill>
+                  <a:schemeClr val="tx1"/>
+                </a:solidFill>
+                <a:latin typeface="Arial" panose="020B0604020202020204" pitchFamily="34" charset="0"/>
+              </a:defRPr>
+            </a:lvl8pPr>
+            <a:lvl9pPr marL="3657600" algn="l" rtl="0" eaLnBrk="0" fontAlgn="base" hangingPunct="0">
+              <a:spcBef>
+                <a:spcPct val="0"/>
+              </a:spcBef>
+              <a:spcAft>
+                <a:spcPct val="0"/>
+              </a:spcAft>
+              <a:defRPr>
+                <a:solidFill>
+                  <a:schemeClr val="tx1"/>
+                </a:solidFill>
+                <a:latin typeface="Arial" panose="020B0604020202020204" pitchFamily="34" charset="0"/>
+              </a:defRPr>
+            </a:lvl9pPr>
+          </a:lstStyle>
+          <a:p>
+            <a:pPr marL="0" marR="0" lvl="0" indent="0" algn="l" defTabSz="914400" rtl="0" eaLnBrk="0" fontAlgn="base" latinLnBrk="0" hangingPunct="0">
+              <a:lnSpc>
+                <a:spcPct val="100000"/>
+              </a:lnSpc>
+              <a:spcBef>
+                <a:spcPct val="0"/>
+              </a:spcBef>
+              <a:spcAft>
+                <a:spcPct val="0"/>
+              </a:spcAft>
+              <a:buClrTx/>
+              <a:buSzTx/>
+              <a:buFontTx/>
+              <a:buNone/>
+              <a:tabLst/>
+            </a:pPr>
+            <a:r>
+              <a:rPr kumimoji="0" lang="en-US" altLang="en-US" sz="1100" b="1" i="0" u="none" strike="noStrike" cap="none" normalizeH="0" baseline="0" dirty="0">
+                <a:ln>
+                  <a:noFill/>
+                </a:ln>
+                <a:solidFill>
+                  <a:srgbClr val="006699"/>
+                </a:solidFill>
+                <a:effectLst/>
+                <a:latin typeface="Consolas" panose="020B0609020204030204" pitchFamily="49" charset="0"/>
+              </a:rPr>
+              <a:t>import</a:t>
+            </a:r>
+            <a:r>
+              <a:rPr kumimoji="0" lang="en-US" altLang="en-US" sz="1200" b="0" i="0" u="none" strike="noStrike" cap="none" normalizeH="0" baseline="0" dirty="0">
+                <a:ln>
+                  <a:noFill/>
+                </a:ln>
+                <a:solidFill>
+                  <a:srgbClr val="273239"/>
+                </a:solidFill>
+                <a:effectLst/>
+                <a:latin typeface="Consolas" panose="020B0609020204030204" pitchFamily="49" charset="0"/>
+              </a:rPr>
+              <a:t> </a:t>
+            </a:r>
+            <a:r>
+              <a:rPr kumimoji="0" lang="en-US" altLang="en-US" sz="1100" b="0" i="0" u="none" strike="noStrike" cap="none" normalizeH="0" baseline="0" dirty="0" err="1">
+                <a:ln>
+                  <a:noFill/>
+                </a:ln>
+                <a:solidFill>
+                  <a:srgbClr val="000000"/>
+                </a:solidFill>
+                <a:effectLst/>
+                <a:latin typeface="Consolas" panose="020B0609020204030204" pitchFamily="49" charset="0"/>
+              </a:rPr>
+              <a:t>java.util.Random</a:t>
+            </a:r>
+            <a:r>
+              <a:rPr kumimoji="0" lang="en-US" altLang="en-US" sz="1100" b="0" i="0" u="none" strike="noStrike" cap="none" normalizeH="0" baseline="0" dirty="0">
+                <a:ln>
+                  <a:noFill/>
+                </a:ln>
+                <a:solidFill>
+                  <a:srgbClr val="000000"/>
+                </a:solidFill>
+                <a:effectLst/>
+                <a:latin typeface="Consolas" panose="020B0609020204030204" pitchFamily="49" charset="0"/>
+              </a:rPr>
+              <a:t>;</a:t>
+            </a:r>
+            <a:r>
+              <a:rPr kumimoji="0" lang="en-US" altLang="en-US" sz="400" b="0" i="0" u="none" strike="noStrike" cap="none" normalizeH="0" baseline="0" dirty="0">
+                <a:ln>
+                  <a:noFill/>
+                </a:ln>
+                <a:solidFill>
+                  <a:schemeClr val="tx1"/>
+                </a:solidFill>
+                <a:effectLst/>
+              </a:rPr>
+              <a:t> </a:t>
+            </a:r>
+            <a:endParaRPr kumimoji="0" lang="en-US" altLang="en-US" sz="1800" b="0" i="0" u="none" strike="noStrike" cap="none" normalizeH="0" baseline="0" dirty="0">
+              <a:ln>
+                <a:noFill/>
+              </a:ln>
+              <a:solidFill>
+                <a:schemeClr val="tx1"/>
+              </a:solidFill>
+              <a:effectLst/>
+              <a:latin typeface="Arial" panose="020B0604020202020204" pitchFamily="34" charset="0"/>
+            </a:endParaRPr>
+          </a:p>
+        </p:txBody>
+      </p:sp>
+      <p:sp>
+        <p:nvSpPr>
+          <p:cNvPr id="11" name="TextBox 10">
+            <a:extLst>
+              <a:ext uri="{FF2B5EF4-FFF2-40B4-BE49-F238E27FC236}">
+                <a16:creationId xmlns:a16="http://schemas.microsoft.com/office/drawing/2014/main" id="{6CE9CC71-9CB1-EFB6-EBD6-756319F5089D}"/>
+              </a:ext>
+            </a:extLst>
+          </p:cNvPr>
+          <p:cNvSpPr txBox="1"/>
+          <p:nvPr/>
+        </p:nvSpPr>
+        <p:spPr>
+          <a:xfrm>
+            <a:off x="8087504" y="1237805"/>
+            <a:ext cx="3429000" cy="1815882"/>
+          </a:xfrm>
+          <a:prstGeom prst="rect">
+            <a:avLst/>
+          </a:prstGeom>
+          <a:noFill/>
+          <a:ln>
+            <a:solidFill>
+              <a:schemeClr val="accent1"/>
+            </a:solidFill>
+          </a:ln>
+        </p:spPr>
+        <p:txBody>
+          <a:bodyPr wrap="square" rtlCol="0">
+            <a:spAutoFit/>
+          </a:bodyPr>
+          <a:lstStyle/>
+          <a:p>
+            <a:r>
+              <a:rPr lang="en-US" sz="2800" dirty="0"/>
+              <a:t>Easiest way to generate random numbers is with </a:t>
+            </a:r>
+            <a:r>
+              <a:rPr lang="en-US" sz="2800" dirty="0" err="1">
+                <a:latin typeface="Consolas" panose="020B0609020204030204" pitchFamily="49" charset="0"/>
+              </a:rPr>
+              <a:t>Random.nextInt</a:t>
+            </a:r>
+            <a:r>
+              <a:rPr lang="en-US" sz="2800" dirty="0">
+                <a:latin typeface="Consolas" panose="020B0609020204030204" pitchFamily="49" charset="0"/>
+              </a:rPr>
+              <a:t>()</a:t>
+            </a:r>
+          </a:p>
+        </p:txBody>
+      </p:sp>
+    </p:spTree>
+    <p:extLst>
+      <p:ext uri="{BB962C8B-B14F-4D97-AF65-F5344CB8AC3E}">
+        <p14:creationId xmlns:p14="http://schemas.microsoft.com/office/powerpoint/2010/main" val="1601155141"/>
+      </p:ext>
+    </p:extLst>
+  </p:cSld>
+  <p:clrMapOvr>
+    <a:masterClrMapping/>
+  </p:clrMapOvr>
+</p:sld>
+</file>
+
+<file path=ppt/slides/slide7.xml><?xml version="1.0" encoding="utf-8"?>
+<p:sld xmlns:a="http://schemas.openxmlformats.org/drawingml/2006/main" xmlns:r="http://schemas.openxmlformats.org/officeDocument/2006/relationships" xmlns:p="http://schemas.openxmlformats.org/presentationml/2006/main">
+  <p:cSld>
+    <p:spTree>
+      <p:nvGrpSpPr>
+        <p:cNvPr id="1" name=""/>
+        <p:cNvGrpSpPr/>
+        <p:nvPr/>
+      </p:nvGrpSpPr>
+      <p:grpSpPr>
+        <a:xfrm>
+          <a:off x="0" y="0"/>
+          <a:ext cx="0" cy="0"/>
+          <a:chOff x="0" y="0"/>
+          <a:chExt cx="0" cy="0"/>
+        </a:xfrm>
+      </p:grpSpPr>
+      <p:grpSp>
+        <p:nvGrpSpPr>
+          <p:cNvPr id="3" name="object 3"/>
+          <p:cNvGrpSpPr/>
+          <p:nvPr/>
+        </p:nvGrpSpPr>
+        <p:grpSpPr>
+          <a:xfrm>
+            <a:off x="-6350" y="6466078"/>
+            <a:ext cx="12204700" cy="398780"/>
+            <a:chOff x="-6350" y="6466078"/>
+            <a:chExt cx="12204700" cy="398780"/>
+          </a:xfrm>
+          <a:solidFill>
+            <a:schemeClr val="accent5">
+              <a:lumMod val="60000"/>
+              <a:lumOff val="40000"/>
+            </a:schemeClr>
+          </a:solidFill>
+        </p:grpSpPr>
+        <p:sp>
+          <p:nvSpPr>
+            <p:cNvPr id="4" name="object 4"/>
+            <p:cNvSpPr/>
+            <p:nvPr/>
+          </p:nvSpPr>
+          <p:spPr>
+            <a:xfrm>
+              <a:off x="0" y="6472428"/>
+              <a:ext cx="12192000" cy="386080"/>
+            </a:xfrm>
+            <a:custGeom>
+              <a:avLst/>
+              <a:gdLst/>
+              <a:ahLst/>
+              <a:cxnLst/>
+              <a:rect l="l" t="t" r="r" b="b"/>
+              <a:pathLst>
+                <a:path w="12192000" h="386079">
+                  <a:moveTo>
+                    <a:pt x="12192000" y="0"/>
+                  </a:moveTo>
+                  <a:lnTo>
+                    <a:pt x="0" y="0"/>
+                  </a:lnTo>
+                  <a:lnTo>
+                    <a:pt x="0" y="385572"/>
+                  </a:lnTo>
+                  <a:lnTo>
+                    <a:pt x="12192000" y="385572"/>
+                  </a:lnTo>
+                  <a:lnTo>
+                    <a:pt x="12192000" y="0"/>
+                  </a:lnTo>
+                  <a:close/>
+                </a:path>
+              </a:pathLst>
+            </a:custGeom>
+            <a:grpFill/>
+            <a:ln>
+              <a:solidFill>
+                <a:schemeClr val="accent5">
+                  <a:lumMod val="75000"/>
+                </a:schemeClr>
+              </a:solidFill>
+            </a:ln>
+          </p:spPr>
+          <p:txBody>
+            <a:bodyPr wrap="square" lIns="0" tIns="0" rIns="0" bIns="0" rtlCol="0"/>
+            <a:lstStyle/>
+            <a:p>
+              <a:endParaRPr/>
+            </a:p>
+          </p:txBody>
+        </p:sp>
+        <p:sp>
+          <p:nvSpPr>
+            <p:cNvPr id="5" name="object 5"/>
+            <p:cNvSpPr/>
+            <p:nvPr/>
+          </p:nvSpPr>
+          <p:spPr>
+            <a:xfrm>
+              <a:off x="0" y="6472428"/>
+              <a:ext cx="12192000" cy="386080"/>
+            </a:xfrm>
+            <a:custGeom>
+              <a:avLst/>
+              <a:gdLst/>
+              <a:ahLst/>
+              <a:cxnLst/>
+              <a:rect l="l" t="t" r="r" b="b"/>
+              <a:pathLst>
+                <a:path w="12192000" h="386079">
+                  <a:moveTo>
+                    <a:pt x="0" y="385572"/>
+                  </a:moveTo>
+                  <a:lnTo>
+                    <a:pt x="12192000" y="385572"/>
+                  </a:lnTo>
+                  <a:lnTo>
+                    <a:pt x="12192000" y="0"/>
+                  </a:lnTo>
+                  <a:lnTo>
+                    <a:pt x="0" y="0"/>
+                  </a:lnTo>
+                  <a:lnTo>
+                    <a:pt x="0" y="385572"/>
+                  </a:lnTo>
+                  <a:close/>
+                </a:path>
+              </a:pathLst>
+            </a:custGeom>
+            <a:grpFill/>
+            <a:ln w="12700">
+              <a:solidFill>
+                <a:schemeClr val="accent5">
+                  <a:lumMod val="75000"/>
+                </a:schemeClr>
+              </a:solidFill>
+            </a:ln>
+          </p:spPr>
+          <p:txBody>
+            <a:bodyPr wrap="square" lIns="0" tIns="0" rIns="0" bIns="0" rtlCol="0"/>
+            <a:lstStyle/>
+            <a:p>
+              <a:endParaRPr/>
+            </a:p>
+          </p:txBody>
+        </p:sp>
+      </p:grpSp>
+      <p:pic>
+        <p:nvPicPr>
+          <p:cNvPr id="22" name="Picture 21" descr="Logo&#10;&#10;Description automatically generated with medium confidence">
+            <a:extLst>
+              <a:ext uri="{FF2B5EF4-FFF2-40B4-BE49-F238E27FC236}">
+                <a16:creationId xmlns:a16="http://schemas.microsoft.com/office/drawing/2014/main" id="{56169902-58B3-4978-946A-5780F321F4CD}"/>
+              </a:ext>
+            </a:extLst>
+          </p:cNvPr>
+          <p:cNvPicPr>
+            <a:picLocks noChangeAspect="1"/>
+          </p:cNvPicPr>
+          <p:nvPr/>
+        </p:nvPicPr>
+        <p:blipFill>
+          <a:blip r:embed="rId2" cstate="print">
+            <a:extLst>
+              <a:ext uri="{28A0092B-C50C-407E-A947-70E740481C1C}">
+                <a14:useLocalDpi xmlns:a14="http://schemas.microsoft.com/office/drawing/2010/main" val="0"/>
+              </a:ext>
+            </a:extLst>
+          </a:blip>
+          <a:stretch>
+            <a:fillRect/>
+          </a:stretch>
+        </p:blipFill>
+        <p:spPr>
+          <a:xfrm>
+            <a:off x="10058400" y="6465057"/>
+            <a:ext cx="1468264" cy="369332"/>
+          </a:xfrm>
+          <a:prstGeom prst="rect">
+            <a:avLst/>
+          </a:prstGeom>
+        </p:spPr>
+      </p:pic>
+      <p:sp>
+        <p:nvSpPr>
+          <p:cNvPr id="24" name="Slide Number Placeholder 23">
+            <a:extLst>
+              <a:ext uri="{FF2B5EF4-FFF2-40B4-BE49-F238E27FC236}">
+                <a16:creationId xmlns:a16="http://schemas.microsoft.com/office/drawing/2014/main" id="{C68E4979-F7D8-4A7C-98C3-63A5B4CDDCB7}"/>
+              </a:ext>
+            </a:extLst>
+          </p:cNvPr>
+          <p:cNvSpPr>
+            <a:spLocks noGrp="1"/>
+          </p:cNvSpPr>
+          <p:nvPr>
+            <p:ph type="sldNum" sz="quarter" idx="7"/>
+          </p:nvPr>
+        </p:nvSpPr>
+        <p:spPr/>
+        <p:txBody>
+          <a:bodyPr/>
+          <a:lstStyle/>
+          <a:p>
+            <a:fld id="{B6F15528-21DE-4FAA-801E-634DDDAF4B2B}" type="slidenum">
+              <a:rPr lang="en-US" smtClean="0"/>
+              <a:t>7</a:t>
+            </a:fld>
+            <a:endParaRPr lang="en-US" dirty="0"/>
+          </a:p>
+        </p:txBody>
+      </p:sp>
+      <p:sp>
+        <p:nvSpPr>
+          <p:cNvPr id="2" name="TextBox 1">
+            <a:extLst>
+              <a:ext uri="{FF2B5EF4-FFF2-40B4-BE49-F238E27FC236}">
+                <a16:creationId xmlns:a16="http://schemas.microsoft.com/office/drawing/2014/main" id="{E0AEC33E-D54D-53ED-7783-9347A63ABF29}"/>
+              </a:ext>
+            </a:extLst>
+          </p:cNvPr>
+          <p:cNvSpPr txBox="1"/>
+          <p:nvPr/>
+        </p:nvSpPr>
+        <p:spPr>
+          <a:xfrm>
+            <a:off x="457200" y="228600"/>
+            <a:ext cx="8479280" cy="2677656"/>
+          </a:xfrm>
+          <a:prstGeom prst="rect">
+            <a:avLst/>
+          </a:prstGeom>
+          <a:noFill/>
+        </p:spPr>
+        <p:txBody>
+          <a:bodyPr wrap="square" rtlCol="0">
+            <a:spAutoFit/>
+          </a:bodyPr>
+          <a:lstStyle/>
+          <a:p>
+            <a:r>
+              <a:rPr lang="en-US" sz="2800" dirty="0"/>
+              <a:t>Write a program that will evaluate a three card poker hand. Your program should be able to identify</a:t>
+            </a:r>
+          </a:p>
+          <a:p>
+            <a:pPr marL="342900" indent="-342900">
+              <a:buAutoNum type="arabicPeriod"/>
+            </a:pPr>
+            <a:r>
+              <a:rPr lang="en-US" sz="2800" dirty="0"/>
+              <a:t>Three of a kind</a:t>
+            </a:r>
+          </a:p>
+          <a:p>
+            <a:pPr marL="342900" indent="-342900">
+              <a:buAutoNum type="arabicPeriod"/>
+            </a:pPr>
+            <a:r>
+              <a:rPr lang="en-US" sz="2800" dirty="0"/>
+              <a:t>Flush</a:t>
+            </a:r>
+          </a:p>
+          <a:p>
+            <a:pPr marL="342900" indent="-342900">
+              <a:buAutoNum type="arabicPeriod"/>
+            </a:pPr>
+            <a:r>
+              <a:rPr lang="en-US" sz="2800" dirty="0"/>
+              <a:t>Sequence</a:t>
+            </a:r>
+          </a:p>
+          <a:p>
+            <a:pPr marL="342900" indent="-342900">
+              <a:buAutoNum type="arabicPeriod"/>
+            </a:pPr>
+            <a:r>
+              <a:rPr lang="en-US" sz="2800" dirty="0"/>
+              <a:t>Two of a kind</a:t>
+            </a:r>
+          </a:p>
+        </p:txBody>
+      </p:sp>
+      <p:pic>
+        <p:nvPicPr>
+          <p:cNvPr id="1026" name="Picture 2" descr="three of hearts - Wikidata">
+            <a:extLst>
+              <a:ext uri="{FF2B5EF4-FFF2-40B4-BE49-F238E27FC236}">
+                <a16:creationId xmlns:a16="http://schemas.microsoft.com/office/drawing/2014/main" id="{CB087992-B5ED-2E9F-8A43-D97C75C64509}"/>
+              </a:ext>
+            </a:extLst>
+          </p:cNvPr>
+          <p:cNvPicPr>
+            <a:picLocks noChangeAspect="1" noChangeArrowheads="1"/>
+          </p:cNvPicPr>
+          <p:nvPr/>
+        </p:nvPicPr>
+        <p:blipFill>
+          <a:blip r:embed="rId3" cstate="print">
+            <a:extLst>
+              <a:ext uri="{28A0092B-C50C-407E-A947-70E740481C1C}">
+                <a14:useLocalDpi xmlns:a14="http://schemas.microsoft.com/office/drawing/2010/main" val="0"/>
+              </a:ext>
+            </a:extLst>
+          </a:blip>
+          <a:srcRect/>
+          <a:stretch>
+            <a:fillRect/>
+          </a:stretch>
+        </p:blipFill>
+        <p:spPr bwMode="auto">
+          <a:xfrm>
+            <a:off x="838200" y="3581400"/>
+            <a:ext cx="870938" cy="1219200"/>
+          </a:xfrm>
+          <a:prstGeom prst="rect">
+            <a:avLst/>
+          </a:prstGeom>
+          <a:noFill/>
+          <a:extLst>
+            <a:ext uri="{909E8E84-426E-40DD-AFC4-6F175D3DCCD1}">
+              <a14:hiddenFill xmlns:a14="http://schemas.microsoft.com/office/drawing/2010/main">
+                <a:solidFill>
+                  <a:srgbClr val="FFFFFF"/>
+                </a:solidFill>
+              </a14:hiddenFill>
+            </a:ext>
+          </a:extLst>
+        </p:spPr>
+      </p:pic>
+      <p:pic>
+        <p:nvPicPr>
+          <p:cNvPr id="1028" name="Picture 4">
+            <a:extLst>
+              <a:ext uri="{FF2B5EF4-FFF2-40B4-BE49-F238E27FC236}">
+                <a16:creationId xmlns:a16="http://schemas.microsoft.com/office/drawing/2014/main" id="{ABE7A014-E453-038A-2765-8F619FF44AFF}"/>
+              </a:ext>
+            </a:extLst>
+          </p:cNvPr>
+          <p:cNvPicPr>
+            <a:picLocks noChangeAspect="1" noChangeArrowheads="1"/>
+          </p:cNvPicPr>
+          <p:nvPr/>
+        </p:nvPicPr>
+        <p:blipFill>
+          <a:blip r:embed="rId4" cstate="print">
+            <a:extLst>
+              <a:ext uri="{28A0092B-C50C-407E-A947-70E740481C1C}">
+                <a14:useLocalDpi xmlns:a14="http://schemas.microsoft.com/office/drawing/2010/main" val="0"/>
+              </a:ext>
+            </a:extLst>
+          </a:blip>
+          <a:srcRect/>
+          <a:stretch>
+            <a:fillRect/>
+          </a:stretch>
+        </p:blipFill>
+        <p:spPr bwMode="auto">
+          <a:xfrm>
+            <a:off x="2286000" y="3581400"/>
+            <a:ext cx="971550" cy="1295800"/>
+          </a:xfrm>
+          <a:prstGeom prst="rect">
+            <a:avLst/>
+          </a:prstGeom>
+          <a:noFill/>
+          <a:extLst>
+            <a:ext uri="{909E8E84-426E-40DD-AFC4-6F175D3DCCD1}">
+              <a14:hiddenFill xmlns:a14="http://schemas.microsoft.com/office/drawing/2010/main">
+                <a:solidFill>
+                  <a:srgbClr val="FFFFFF"/>
+                </a:solidFill>
+              </a14:hiddenFill>
+            </a:ext>
+          </a:extLst>
+        </p:spPr>
+      </p:pic>
+      <p:pic>
+        <p:nvPicPr>
+          <p:cNvPr id="1030" name="Picture 6">
+            <a:extLst>
+              <a:ext uri="{FF2B5EF4-FFF2-40B4-BE49-F238E27FC236}">
+                <a16:creationId xmlns:a16="http://schemas.microsoft.com/office/drawing/2014/main" id="{D62A7151-9CB7-72C6-AD57-6340DEC6A6B7}"/>
+              </a:ext>
+            </a:extLst>
+          </p:cNvPr>
+          <p:cNvPicPr>
+            <a:picLocks noChangeAspect="1" noChangeArrowheads="1"/>
+          </p:cNvPicPr>
+          <p:nvPr/>
+        </p:nvPicPr>
+        <p:blipFill>
+          <a:blip r:embed="rId5" cstate="print">
+            <a:extLst>
+              <a:ext uri="{28A0092B-C50C-407E-A947-70E740481C1C}">
+                <a14:useLocalDpi xmlns:a14="http://schemas.microsoft.com/office/drawing/2010/main" val="0"/>
+              </a:ext>
+            </a:extLst>
+          </a:blip>
+          <a:srcRect/>
+          <a:stretch>
+            <a:fillRect/>
+          </a:stretch>
+        </p:blipFill>
+        <p:spPr bwMode="auto">
+          <a:xfrm>
+            <a:off x="3867150" y="3559389"/>
+            <a:ext cx="1143000" cy="1428751"/>
+          </a:xfrm>
+          <a:prstGeom prst="rect">
+            <a:avLst/>
+          </a:prstGeom>
+          <a:noFill/>
+          <a:extLst>
+            <a:ext uri="{909E8E84-426E-40DD-AFC4-6F175D3DCCD1}">
+              <a14:hiddenFill xmlns:a14="http://schemas.microsoft.com/office/drawing/2010/main">
+                <a:solidFill>
+                  <a:srgbClr val="FFFFFF"/>
+                </a:solidFill>
+              </a14:hiddenFill>
+            </a:ext>
+          </a:extLst>
+        </p:spPr>
+      </p:pic>
+      <mc:AlternateContent xmlns:mc="http://schemas.openxmlformats.org/markup-compatibility/2006" xmlns:p14="http://schemas.microsoft.com/office/powerpoint/2010/main">
+        <mc:Choice Requires="p14">
+          <p:contentPart p14:bwMode="auto" r:id="rId6">
+            <p14:nvContentPartPr>
+              <p14:cNvPr id="6" name="Ink 5">
+                <a:extLst>
+                  <a:ext uri="{FF2B5EF4-FFF2-40B4-BE49-F238E27FC236}">
+                    <a16:creationId xmlns:a16="http://schemas.microsoft.com/office/drawing/2014/main" id="{3AADBA81-F2F5-6C28-63F8-D7EDCA8D6D9B}"/>
+                  </a:ext>
+                </a:extLst>
+              </p14:cNvPr>
+              <p14:cNvContentPartPr/>
+              <p14:nvPr/>
+            </p14:nvContentPartPr>
+            <p14:xfrm>
+              <a:off x="535621" y="3361594"/>
+              <a:ext cx="225720" cy="1620720"/>
+            </p14:xfrm>
+          </p:contentPart>
+        </mc:Choice>
+        <mc:Fallback xmlns="">
+          <p:pic>
+            <p:nvPicPr>
+              <p:cNvPr id="6" name="Ink 5">
+                <a:extLst>
+                  <a:ext uri="{FF2B5EF4-FFF2-40B4-BE49-F238E27FC236}">
+                    <a16:creationId xmlns:a16="http://schemas.microsoft.com/office/drawing/2014/main" id="{3AADBA81-F2F5-6C28-63F8-D7EDCA8D6D9B}"/>
+                  </a:ext>
+                </a:extLst>
+              </p:cNvPr>
+              <p:cNvPicPr/>
+              <p:nvPr/>
+            </p:nvPicPr>
+            <p:blipFill>
+              <a:blip r:embed="rId7"/>
+              <a:stretch>
+                <a:fillRect/>
+              </a:stretch>
+            </p:blipFill>
+            <p:spPr>
+              <a:xfrm>
+                <a:off x="529501" y="3355474"/>
+                <a:ext cx="237960" cy="1632960"/>
+              </a:xfrm>
+              <a:prstGeom prst="rect">
+                <a:avLst/>
+              </a:prstGeom>
+            </p:spPr>
+          </p:pic>
+        </mc:Fallback>
+      </mc:AlternateContent>
+      <mc:AlternateContent xmlns:mc="http://schemas.openxmlformats.org/markup-compatibility/2006" xmlns:p14="http://schemas.microsoft.com/office/powerpoint/2010/main">
+        <mc:Choice Requires="p14">
+          <p:contentPart p14:bwMode="auto" r:id="rId8">
+            <p14:nvContentPartPr>
+              <p14:cNvPr id="8" name="Ink 7">
+                <a:extLst>
+                  <a:ext uri="{FF2B5EF4-FFF2-40B4-BE49-F238E27FC236}">
+                    <a16:creationId xmlns:a16="http://schemas.microsoft.com/office/drawing/2014/main" id="{C6A3B909-EA74-9630-A40C-258521952102}"/>
+                  </a:ext>
+                </a:extLst>
+              </p14:cNvPr>
+              <p14:cNvContentPartPr/>
+              <p14:nvPr/>
+            </p14:nvContentPartPr>
+            <p14:xfrm>
+              <a:off x="4940581" y="3405154"/>
+              <a:ext cx="288720" cy="1725480"/>
+            </p14:xfrm>
+          </p:contentPart>
+        </mc:Choice>
+        <mc:Fallback xmlns="">
+          <p:pic>
+            <p:nvPicPr>
+              <p:cNvPr id="8" name="Ink 7">
+                <a:extLst>
+                  <a:ext uri="{FF2B5EF4-FFF2-40B4-BE49-F238E27FC236}">
+                    <a16:creationId xmlns:a16="http://schemas.microsoft.com/office/drawing/2014/main" id="{C6A3B909-EA74-9630-A40C-258521952102}"/>
+                  </a:ext>
+                </a:extLst>
+              </p:cNvPr>
+              <p:cNvPicPr/>
+              <p:nvPr/>
+            </p:nvPicPr>
+            <p:blipFill>
+              <a:blip r:embed="rId9"/>
+              <a:stretch>
+                <a:fillRect/>
+              </a:stretch>
+            </p:blipFill>
+            <p:spPr>
+              <a:xfrm>
+                <a:off x="4934461" y="3399034"/>
+                <a:ext cx="300960" cy="1737720"/>
+              </a:xfrm>
+              <a:prstGeom prst="rect">
+                <a:avLst/>
+              </a:prstGeom>
+            </p:spPr>
+          </p:pic>
+        </mc:Fallback>
+      </mc:AlternateContent>
+      <p:sp>
+        <p:nvSpPr>
+          <p:cNvPr id="9" name="TextBox 8">
+            <a:extLst>
+              <a:ext uri="{FF2B5EF4-FFF2-40B4-BE49-F238E27FC236}">
+                <a16:creationId xmlns:a16="http://schemas.microsoft.com/office/drawing/2014/main" id="{656F0D7F-3A8A-1209-38B7-89054BD2E45A}"/>
+              </a:ext>
+            </a:extLst>
+          </p:cNvPr>
+          <p:cNvSpPr txBox="1"/>
+          <p:nvPr/>
+        </p:nvSpPr>
+        <p:spPr>
+          <a:xfrm>
+            <a:off x="2321653" y="5267182"/>
+            <a:ext cx="1223412" cy="369332"/>
+          </a:xfrm>
+          <a:prstGeom prst="rect">
+            <a:avLst/>
+          </a:prstGeom>
+          <a:noFill/>
+        </p:spPr>
+        <p:txBody>
+          <a:bodyPr wrap="none" rtlCol="0">
+            <a:spAutoFit/>
+          </a:bodyPr>
+          <a:lstStyle/>
+          <a:p>
+            <a:r>
+              <a:rPr lang="en-US" dirty="0"/>
+              <a:t>Sequence</a:t>
+            </a:r>
+          </a:p>
+        </p:txBody>
+      </p:sp>
+      <p:pic>
+        <p:nvPicPr>
+          <p:cNvPr id="10" name="Picture 6">
+            <a:extLst>
+              <a:ext uri="{FF2B5EF4-FFF2-40B4-BE49-F238E27FC236}">
+                <a16:creationId xmlns:a16="http://schemas.microsoft.com/office/drawing/2014/main" id="{6C866260-2A31-7240-A70D-AED31DF82913}"/>
+              </a:ext>
+            </a:extLst>
+          </p:cNvPr>
+          <p:cNvPicPr>
+            <a:picLocks noChangeAspect="1" noChangeArrowheads="1"/>
+          </p:cNvPicPr>
+          <p:nvPr/>
+        </p:nvPicPr>
+        <p:blipFill>
+          <a:blip r:embed="rId5" cstate="print">
+            <a:extLst>
+              <a:ext uri="{28A0092B-C50C-407E-A947-70E740481C1C}">
+                <a14:useLocalDpi xmlns:a14="http://schemas.microsoft.com/office/drawing/2010/main" val="0"/>
+              </a:ext>
+            </a:extLst>
+          </a:blip>
+          <a:srcRect/>
+          <a:stretch>
+            <a:fillRect/>
+          </a:stretch>
+        </p:blipFill>
+        <p:spPr bwMode="auto">
+          <a:xfrm>
+            <a:off x="6781800" y="3587740"/>
+            <a:ext cx="1143000" cy="1428751"/>
+          </a:xfrm>
+          <a:prstGeom prst="rect">
+            <a:avLst/>
+          </a:prstGeom>
+          <a:noFill/>
+          <a:extLst>
+            <a:ext uri="{909E8E84-426E-40DD-AFC4-6F175D3DCCD1}">
+              <a14:hiddenFill xmlns:a14="http://schemas.microsoft.com/office/drawing/2010/main">
+                <a:solidFill>
+                  <a:srgbClr val="FFFFFF"/>
+                </a:solidFill>
+              </a14:hiddenFill>
+            </a:ext>
+          </a:extLst>
+        </p:spPr>
+      </p:pic>
+      <p:pic>
+        <p:nvPicPr>
+          <p:cNvPr id="11" name="Picture 6">
+            <a:extLst>
+              <a:ext uri="{FF2B5EF4-FFF2-40B4-BE49-F238E27FC236}">
+                <a16:creationId xmlns:a16="http://schemas.microsoft.com/office/drawing/2014/main" id="{2F36F1D2-69F5-9CFB-03C9-D79C503924B9}"/>
+              </a:ext>
+            </a:extLst>
+          </p:cNvPr>
+          <p:cNvPicPr>
+            <a:picLocks noChangeAspect="1" noChangeArrowheads="1"/>
+          </p:cNvPicPr>
+          <p:nvPr/>
+        </p:nvPicPr>
+        <p:blipFill>
+          <a:blip r:embed="rId5" cstate="print">
+            <a:extLst>
+              <a:ext uri="{28A0092B-C50C-407E-A947-70E740481C1C}">
+                <a14:useLocalDpi xmlns:a14="http://schemas.microsoft.com/office/drawing/2010/main" val="0"/>
+              </a:ext>
+            </a:extLst>
+          </a:blip>
+          <a:srcRect/>
+          <a:stretch>
+            <a:fillRect/>
+          </a:stretch>
+        </p:blipFill>
+        <p:spPr bwMode="auto">
+          <a:xfrm>
+            <a:off x="8334299" y="3584245"/>
+            <a:ext cx="1143000" cy="1428751"/>
+          </a:xfrm>
+          <a:prstGeom prst="rect">
+            <a:avLst/>
+          </a:prstGeom>
+          <a:noFill/>
+          <a:extLst>
+            <a:ext uri="{909E8E84-426E-40DD-AFC4-6F175D3DCCD1}">
+              <a14:hiddenFill xmlns:a14="http://schemas.microsoft.com/office/drawing/2010/main">
+                <a:solidFill>
+                  <a:srgbClr val="FFFFFF"/>
+                </a:solidFill>
+              </a14:hiddenFill>
+            </a:ext>
+          </a:extLst>
+        </p:spPr>
+      </p:pic>
+      <mc:AlternateContent xmlns:mc="http://schemas.openxmlformats.org/markup-compatibility/2006" xmlns:p14="http://schemas.microsoft.com/office/powerpoint/2010/main">
+        <mc:Choice Requires="p14">
+          <p:contentPart p14:bwMode="auto" r:id="rId10">
+            <p14:nvContentPartPr>
+              <p14:cNvPr id="12" name="Ink 11">
+                <a:extLst>
+                  <a:ext uri="{FF2B5EF4-FFF2-40B4-BE49-F238E27FC236}">
+                    <a16:creationId xmlns:a16="http://schemas.microsoft.com/office/drawing/2014/main" id="{C2A5EEAB-364B-D847-B187-9F2F617ABD0E}"/>
+                  </a:ext>
+                </a:extLst>
+              </p14:cNvPr>
+              <p14:cNvContentPartPr/>
+              <p14:nvPr/>
+            </p14:nvContentPartPr>
+            <p14:xfrm>
+              <a:off x="6503175" y="3400911"/>
+              <a:ext cx="225720" cy="1620720"/>
+            </p14:xfrm>
+          </p:contentPart>
+        </mc:Choice>
+        <mc:Fallback xmlns="">
+          <p:pic>
+            <p:nvPicPr>
+              <p:cNvPr id="12" name="Ink 11">
+                <a:extLst>
+                  <a:ext uri="{FF2B5EF4-FFF2-40B4-BE49-F238E27FC236}">
+                    <a16:creationId xmlns:a16="http://schemas.microsoft.com/office/drawing/2014/main" id="{C2A5EEAB-364B-D847-B187-9F2F617ABD0E}"/>
+                  </a:ext>
+                </a:extLst>
+              </p:cNvPr>
+              <p:cNvPicPr/>
+              <p:nvPr/>
+            </p:nvPicPr>
+            <p:blipFill>
+              <a:blip r:embed="rId7"/>
+              <a:stretch>
+                <a:fillRect/>
+              </a:stretch>
+            </p:blipFill>
+            <p:spPr>
+              <a:xfrm>
+                <a:off x="6497055" y="3394791"/>
+                <a:ext cx="237960" cy="1632960"/>
+              </a:xfrm>
+              <a:prstGeom prst="rect">
+                <a:avLst/>
+              </a:prstGeom>
+            </p:spPr>
+          </p:pic>
+        </mc:Fallback>
+      </mc:AlternateContent>
+      <mc:AlternateContent xmlns:mc="http://schemas.openxmlformats.org/markup-compatibility/2006" xmlns:p14="http://schemas.microsoft.com/office/powerpoint/2010/main">
+        <mc:Choice Requires="p14">
+          <p:contentPart p14:bwMode="auto" r:id="rId11">
+            <p14:nvContentPartPr>
+              <p14:cNvPr id="13" name="Ink 12">
+                <a:extLst>
+                  <a:ext uri="{FF2B5EF4-FFF2-40B4-BE49-F238E27FC236}">
+                    <a16:creationId xmlns:a16="http://schemas.microsoft.com/office/drawing/2014/main" id="{C365548C-79C7-8E0B-C3AF-9A524BD444AD}"/>
+                  </a:ext>
+                </a:extLst>
+              </p14:cNvPr>
+              <p14:cNvContentPartPr/>
+              <p14:nvPr/>
+            </p14:nvContentPartPr>
+            <p14:xfrm>
+              <a:off x="10908135" y="3444471"/>
+              <a:ext cx="288720" cy="1725480"/>
+            </p14:xfrm>
+          </p:contentPart>
+        </mc:Choice>
+        <mc:Fallback xmlns="">
+          <p:pic>
+            <p:nvPicPr>
+              <p:cNvPr id="13" name="Ink 12">
+                <a:extLst>
+                  <a:ext uri="{FF2B5EF4-FFF2-40B4-BE49-F238E27FC236}">
+                    <a16:creationId xmlns:a16="http://schemas.microsoft.com/office/drawing/2014/main" id="{C365548C-79C7-8E0B-C3AF-9A524BD444AD}"/>
+                  </a:ext>
+                </a:extLst>
+              </p:cNvPr>
+              <p:cNvPicPr/>
+              <p:nvPr/>
+            </p:nvPicPr>
+            <p:blipFill>
+              <a:blip r:embed="rId9"/>
+              <a:stretch>
+                <a:fillRect/>
+              </a:stretch>
+            </p:blipFill>
+            <p:spPr>
+              <a:xfrm>
+                <a:off x="10902015" y="3438351"/>
+                <a:ext cx="300960" cy="1737720"/>
+              </a:xfrm>
+              <a:prstGeom prst="rect">
+                <a:avLst/>
+              </a:prstGeom>
+            </p:spPr>
+          </p:pic>
+        </mc:Fallback>
+      </mc:AlternateContent>
+      <p:sp>
+        <p:nvSpPr>
+          <p:cNvPr id="14" name="TextBox 13">
+            <a:extLst>
+              <a:ext uri="{FF2B5EF4-FFF2-40B4-BE49-F238E27FC236}">
+                <a16:creationId xmlns:a16="http://schemas.microsoft.com/office/drawing/2014/main" id="{35A8FE57-8376-1E14-3B6E-CA2B50B25B82}"/>
+              </a:ext>
+            </a:extLst>
+          </p:cNvPr>
+          <p:cNvSpPr txBox="1"/>
+          <p:nvPr/>
+        </p:nvSpPr>
+        <p:spPr>
+          <a:xfrm>
+            <a:off x="7848600" y="5334000"/>
+            <a:ext cx="1556836" cy="646331"/>
+          </a:xfrm>
+          <a:prstGeom prst="rect">
+            <a:avLst/>
+          </a:prstGeom>
+          <a:noFill/>
+        </p:spPr>
+        <p:txBody>
+          <a:bodyPr wrap="none" rtlCol="0">
+            <a:spAutoFit/>
+          </a:bodyPr>
+          <a:lstStyle/>
+          <a:p>
+            <a:r>
+              <a:rPr lang="en-US" dirty="0"/>
+              <a:t>Flush</a:t>
+            </a:r>
+          </a:p>
+          <a:p>
+            <a:r>
+              <a:rPr lang="en-US" dirty="0"/>
+              <a:t>Two of a kind</a:t>
+            </a:r>
+          </a:p>
+        </p:txBody>
+      </p:sp>
+      <p:pic>
+        <p:nvPicPr>
+          <p:cNvPr id="1034" name="Picture 10">
+            <a:extLst>
+              <a:ext uri="{FF2B5EF4-FFF2-40B4-BE49-F238E27FC236}">
+                <a16:creationId xmlns:a16="http://schemas.microsoft.com/office/drawing/2014/main" id="{4620D563-0A85-4041-95D2-CDCAE43425D5}"/>
+              </a:ext>
+            </a:extLst>
+          </p:cNvPr>
+          <p:cNvPicPr>
+            <a:picLocks noChangeAspect="1" noChangeArrowheads="1"/>
+          </p:cNvPicPr>
+          <p:nvPr/>
+        </p:nvPicPr>
+        <p:blipFill>
+          <a:blip r:embed="rId12" cstate="print">
+            <a:extLst>
+              <a:ext uri="{28A0092B-C50C-407E-A947-70E740481C1C}">
+                <a14:useLocalDpi xmlns:a14="http://schemas.microsoft.com/office/drawing/2010/main" val="0"/>
+              </a:ext>
+            </a:extLst>
+          </a:blip>
+          <a:srcRect/>
+          <a:stretch>
+            <a:fillRect/>
+          </a:stretch>
+        </p:blipFill>
+        <p:spPr bwMode="auto">
+          <a:xfrm>
+            <a:off x="9674936" y="3581400"/>
+            <a:ext cx="1145277" cy="1431596"/>
+          </a:xfrm>
+          <a:prstGeom prst="rect">
+            <a:avLst/>
+          </a:prstGeom>
+          <a:noFill/>
+          <a:extLst>
+            <a:ext uri="{909E8E84-426E-40DD-AFC4-6F175D3DCCD1}">
+              <a14:hiddenFill xmlns:a14="http://schemas.microsoft.com/office/drawing/2010/main">
+                <a:solidFill>
+                  <a:srgbClr val="FFFFFF"/>
+                </a:solidFill>
+              </a14:hiddenFill>
+            </a:ext>
+          </a:extLst>
+        </p:spPr>
+      </p:pic>
+    </p:spTree>
+    <p:extLst>
+      <p:ext uri="{BB962C8B-B14F-4D97-AF65-F5344CB8AC3E}">
+        <p14:creationId xmlns:p14="http://schemas.microsoft.com/office/powerpoint/2010/main" val="4092402405"/>
       </p:ext>
     </p:extLst>
   </p:cSld>

</xml_diff>